<commit_message>
reworked configMap and secrets incl. more demos & examples
</commit_message>
<xml_diff>
--- a/kubernetes/06_configmap_secrets.pptx
+++ b/kubernetes/06_configmap_secrets.pptx
@@ -5,19 +5,21 @@
     <p:sldMasterId id="2147483733" r:id="rId1"/>
   </p:sldMasterIdLst>
   <p:notesMasterIdLst>
-    <p:notesMasterId r:id="rId9"/>
+    <p:notesMasterId r:id="rId11"/>
   </p:notesMasterIdLst>
   <p:handoutMasterIdLst>
-    <p:handoutMasterId r:id="rId10"/>
+    <p:handoutMasterId r:id="rId12"/>
   </p:handoutMasterIdLst>
   <p:sldIdLst>
     <p:sldId id="433" r:id="rId2"/>
     <p:sldId id="442" r:id="rId3"/>
     <p:sldId id="444" r:id="rId4"/>
-    <p:sldId id="449" r:id="rId5"/>
-    <p:sldId id="450" r:id="rId6"/>
-    <p:sldId id="451" r:id="rId7"/>
-    <p:sldId id="265" r:id="rId8"/>
+    <p:sldId id="450" r:id="rId5"/>
+    <p:sldId id="449" r:id="rId6"/>
+    <p:sldId id="452" r:id="rId7"/>
+    <p:sldId id="453" r:id="rId8"/>
+    <p:sldId id="451" r:id="rId9"/>
+    <p:sldId id="265" r:id="rId10"/>
   </p:sldIdLst>
   <p:sldSz cx="12195175" cy="6858000"/>
   <p:notesSz cx="6858000" cy="9144000"/>
@@ -193,6 +195,10 @@
 </p:presentation>
 </file>
 
+<file path=ppt/revisionInfo.xml><?xml version="1.0" encoding="utf-8"?>
+<p1510:revInfo xmlns:a="http://schemas.openxmlformats.org/drawingml/2006/main" xmlns:r="http://schemas.openxmlformats.org/officeDocument/2006/relationships" xmlns:p1510="http://schemas.microsoft.com/office/powerpoint/2015/10/main"/>
+</file>
+
 <file path=ppt/handoutMasters/handoutMaster1.xml><?xml version="1.0" encoding="utf-8"?>
 <p:handoutMaster xmlns:a="http://schemas.openxmlformats.org/drawingml/2006/main" xmlns:r="http://schemas.openxmlformats.org/officeDocument/2006/relationships" xmlns:p="http://schemas.openxmlformats.org/presentationml/2006/main">
   <p:cSld>
@@ -735,7 +741,18 @@
           <a:bodyPr/>
           <a:lstStyle/>
           <a:p>
-            <a:endParaRPr lang="en-US" dirty="0"/>
+            <a:r>
+              <a:rPr lang="en-US" dirty="0"/>
+              <a:t>Secrets &amp; </a:t>
+            </a:r>
+            <a:r>
+              <a:rPr lang="en-US" dirty="0" err="1"/>
+              <a:t>configMaps</a:t>
+            </a:r>
+            <a:r>
+              <a:rPr lang="en-US" dirty="0"/>
+              <a:t> are always bound to a namespace. Use the volume API to integrate both into your pods.</a:t>
+            </a:r>
           </a:p>
         </p:txBody>
       </p:sp>
@@ -820,6 +837,136 @@
           <a:bodyPr/>
           <a:lstStyle/>
           <a:p>
+            <a:r>
+              <a:rPr lang="en-US" dirty="0"/>
+              <a:t>Create a </a:t>
+            </a:r>
+            <a:r>
+              <a:rPr lang="en-US" dirty="0" err="1"/>
+              <a:t>configmap</a:t>
+            </a:r>
+            <a:r>
+              <a:rPr lang="en-US" dirty="0"/>
+              <a:t> example: </a:t>
+            </a:r>
+          </a:p>
+          <a:p>
+            <a:r>
+              <a:rPr lang="en-US" dirty="0" err="1"/>
+              <a:t>kubectl</a:t>
+            </a:r>
+            <a:r>
+              <a:rPr lang="en-US" dirty="0"/>
+              <a:t> create </a:t>
+            </a:r>
+            <a:r>
+              <a:rPr lang="en-US" dirty="0" err="1"/>
+              <a:t>configmap</a:t>
+            </a:r>
+            <a:r>
+              <a:rPr lang="en-US" dirty="0"/>
+              <a:t> test-config --from-literal=</a:t>
+            </a:r>
+            <a:r>
+              <a:rPr lang="en-US" dirty="0" err="1"/>
+              <a:t>test.type</a:t>
+            </a:r>
+            <a:r>
+              <a:rPr lang="en-US" dirty="0"/>
+              <a:t>=unit --from-literal=</a:t>
+            </a:r>
+            <a:r>
+              <a:rPr lang="en-US" dirty="0" err="1"/>
+              <a:t>test.exec</a:t>
+            </a:r>
+            <a:r>
+              <a:rPr lang="en-US" dirty="0"/>
+              <a:t>=always</a:t>
+            </a:r>
+          </a:p>
+          <a:p>
+            <a:endParaRPr lang="en-US" dirty="0"/>
+          </a:p>
+          <a:p>
+            <a:r>
+              <a:rPr lang="en-US" dirty="0"/>
+              <a:t>Show the </a:t>
+            </a:r>
+            <a:r>
+              <a:rPr lang="en-US" dirty="0" err="1"/>
+              <a:t>pod_with_configmap.yaml</a:t>
+            </a:r>
+            <a:r>
+              <a:rPr lang="en-US" dirty="0"/>
+              <a:t> =&gt; you can include all values from a </a:t>
+            </a:r>
+            <a:r>
+              <a:rPr lang="en-US" dirty="0" err="1"/>
+              <a:t>configmap</a:t>
+            </a:r>
+            <a:r>
+              <a:rPr lang="en-US" dirty="0"/>
+              <a:t> or reference to specific keys. It is also possible to reference multiple </a:t>
+            </a:r>
+            <a:r>
+              <a:rPr lang="en-US" dirty="0" err="1"/>
+              <a:t>configMaps</a:t>
+            </a:r>
+            <a:r>
+              <a:rPr lang="en-US" dirty="0"/>
+              <a:t>. When deploying it to the cluster it will start &amp; go to status “completed” very quickly. Use “</a:t>
+            </a:r>
+            <a:r>
+              <a:rPr lang="en-US" dirty="0" err="1"/>
+              <a:t>kubectl</a:t>
+            </a:r>
+            <a:r>
+              <a:rPr lang="en-US" dirty="0"/>
+              <a:t> get pods –a” to display also terminated pods. Use “</a:t>
+            </a:r>
+            <a:r>
+              <a:rPr lang="en-US" dirty="0" err="1"/>
+              <a:t>kubectl</a:t>
+            </a:r>
+            <a:r>
+              <a:rPr lang="en-US" dirty="0"/>
+              <a:t> logs test-</a:t>
+            </a:r>
+            <a:r>
+              <a:rPr lang="en-US" dirty="0" err="1"/>
+              <a:t>configmap</a:t>
+            </a:r>
+            <a:r>
+              <a:rPr lang="en-US" dirty="0"/>
+              <a:t>” to view the environment sent to </a:t>
+            </a:r>
+            <a:r>
+              <a:rPr lang="en-US" dirty="0" err="1"/>
+              <a:t>stdout</a:t>
+            </a:r>
+            <a:r>
+              <a:rPr lang="en-US" dirty="0"/>
+              <a:t>.</a:t>
+            </a:r>
+          </a:p>
+          <a:p>
+            <a:endParaRPr lang="en-US" dirty="0"/>
+          </a:p>
+          <a:p>
+            <a:r>
+              <a:rPr lang="en-US" dirty="0"/>
+              <a:t>Instead of mapping the </a:t>
+            </a:r>
+            <a:r>
+              <a:rPr lang="en-US" dirty="0" err="1"/>
+              <a:t>configMap</a:t>
+            </a:r>
+            <a:r>
+              <a:rPr lang="en-US" dirty="0"/>
+              <a:t> content to environment variables, it is also possible to mount them as files to a directory. This will be part of the exercise.</a:t>
+            </a:r>
+          </a:p>
+          <a:p>
             <a:endParaRPr lang="en-US" dirty="0"/>
           </a:p>
         </p:txBody>
@@ -851,7 +998,7 @@
     </p:spTree>
     <p:extLst>
       <p:ext uri="{BB962C8B-B14F-4D97-AF65-F5344CB8AC3E}">
-        <p14:creationId xmlns:p14="http://schemas.microsoft.com/office/powerpoint/2010/main" val="1151262875"/>
+        <p14:creationId xmlns:p14="http://schemas.microsoft.com/office/powerpoint/2010/main" val="760292589"/>
       </p:ext>
     </p:extLst>
   </p:cSld>
@@ -905,7 +1052,56 @@
           <a:bodyPr/>
           <a:lstStyle/>
           <a:p>
-            <a:endParaRPr lang="en-US" dirty="0"/>
+            <a:r>
+              <a:rPr lang="en-US" dirty="0"/>
+              <a:t>There are 3 different types of secrets</a:t>
+            </a:r>
+          </a:p>
+          <a:p>
+            <a:pPr marL="285750" indent="-285750">
+              <a:buFontTx/>
+              <a:buChar char="-"/>
+            </a:pPr>
+            <a:r>
+              <a:rPr lang="en-US" dirty="0"/>
+              <a:t>generic: to store credentials like passwords. Include as </a:t>
+            </a:r>
+            <a:r>
+              <a:rPr lang="en-US" dirty="0" err="1"/>
+              <a:t>env</a:t>
+            </a:r>
+            <a:r>
+              <a:rPr lang="en-US" dirty="0"/>
+              <a:t> variables or mount files</a:t>
+            </a:r>
+          </a:p>
+          <a:p>
+            <a:pPr marL="285750" indent="-285750">
+              <a:buFontTx/>
+              <a:buChar char="-"/>
+            </a:pPr>
+            <a:r>
+              <a:rPr lang="en-US" dirty="0"/>
+              <a:t>TLS: store certificates to setup TLS e.g. with a webserver</a:t>
+            </a:r>
+          </a:p>
+          <a:p>
+            <a:pPr marL="285750" indent="-285750">
+              <a:buFontTx/>
+              <a:buChar char="-"/>
+            </a:pPr>
+            <a:r>
+              <a:rPr lang="en-US" dirty="0"/>
+              <a:t>Docker-registry: Contains credentials to authenticate pulls from protected registry like the docker store or a private registry. Assign the secret as “</a:t>
+            </a:r>
+            <a:r>
+              <a:rPr lang="en-US" dirty="0" err="1"/>
+              <a:t>imagePullSecret</a:t>
+            </a:r>
+            <a:r>
+              <a:rPr lang="en-US" dirty="0"/>
+              <a:t>” to a pod, to use the credentials for image pulling for this pod. </a:t>
+            </a:r>
           </a:p>
         </p:txBody>
       </p:sp>
@@ -936,7 +1132,7 @@
     </p:spTree>
     <p:extLst>
       <p:ext uri="{BB962C8B-B14F-4D97-AF65-F5344CB8AC3E}">
-        <p14:creationId xmlns:p14="http://schemas.microsoft.com/office/powerpoint/2010/main" val="760292589"/>
+        <p14:creationId xmlns:p14="http://schemas.microsoft.com/office/powerpoint/2010/main" val="1151262875"/>
       </p:ext>
     </p:extLst>
   </p:cSld>
@@ -947,6 +1143,237 @@
 </file>
 
 <file path=ppt/notesSlides/notesSlide6.xml><?xml version="1.0" encoding="utf-8"?>
+<p:notes xmlns:a="http://schemas.openxmlformats.org/drawingml/2006/main" xmlns:r="http://schemas.openxmlformats.org/officeDocument/2006/relationships" xmlns:p="http://schemas.openxmlformats.org/presentationml/2006/main">
+  <p:cSld>
+    <p:spTree>
+      <p:nvGrpSpPr>
+        <p:cNvPr id="1" name=""/>
+        <p:cNvGrpSpPr/>
+        <p:nvPr/>
+      </p:nvGrpSpPr>
+      <p:grpSpPr>
+        <a:xfrm>
+          <a:off x="0" y="0"/>
+          <a:ext cx="0" cy="0"/>
+          <a:chOff x="0" y="0"/>
+          <a:chExt cx="0" cy="0"/>
+        </a:xfrm>
+      </p:grpSpPr>
+      <p:sp>
+        <p:nvSpPr>
+          <p:cNvPr id="2" name="Slide Image Placeholder 1"/>
+          <p:cNvSpPr>
+            <a:spLocks noGrp="1" noRot="1" noChangeAspect="1"/>
+          </p:cNvSpPr>
+          <p:nvPr>
+            <p:ph type="sldImg"/>
+          </p:nvPr>
+        </p:nvSpPr>
+        <p:spPr/>
+      </p:sp>
+      <p:sp>
+        <p:nvSpPr>
+          <p:cNvPr id="3" name="Notes Placeholder 2"/>
+          <p:cNvSpPr>
+            <a:spLocks noGrp="1"/>
+          </p:cNvSpPr>
+          <p:nvPr>
+            <p:ph type="body" idx="1"/>
+          </p:nvPr>
+        </p:nvSpPr>
+        <p:spPr/>
+        <p:txBody>
+          <a:bodyPr/>
+          <a:lstStyle/>
+          <a:p>
+            <a:r>
+              <a:rPr lang="en-US" dirty="0"/>
+              <a:t>Secrets can be created based on files or values from literals. The data gets base64 encoded and as long as you view the resource via </a:t>
+            </a:r>
+            <a:r>
+              <a:rPr lang="en-US" dirty="0" err="1"/>
+              <a:t>kubectl</a:t>
+            </a:r>
+            <a:r>
+              <a:rPr lang="en-US" dirty="0"/>
+              <a:t>, it stays this way. To view the data take the string, print it to </a:t>
+            </a:r>
+            <a:r>
+              <a:rPr lang="en-US" dirty="0" err="1"/>
+              <a:t>stdout</a:t>
+            </a:r>
+            <a:r>
+              <a:rPr lang="en-US" dirty="0"/>
+              <a:t> and pipe it into base64 –d.</a:t>
+            </a:r>
+          </a:p>
+          <a:p>
+            <a:r>
+              <a:rPr lang="en-US" dirty="0"/>
+              <a:t>Example: echo U2VjcmV0NGV2ZXIK | base64 –d</a:t>
+            </a:r>
+          </a:p>
+          <a:p>
+            <a:endParaRPr lang="en-US" dirty="0"/>
+          </a:p>
+          <a:p>
+            <a:r>
+              <a:rPr lang="en-US" dirty="0"/>
+              <a:t>To rebuild the demo use the </a:t>
+            </a:r>
+            <a:r>
+              <a:rPr lang="en-US" dirty="0" err="1"/>
+              <a:t>secret_pod_demo.yaml</a:t>
+            </a:r>
+            <a:r>
+              <a:rPr lang="en-US" dirty="0"/>
+              <a:t> from ./</a:t>
+            </a:r>
+            <a:r>
+              <a:rPr lang="en-US" dirty="0" err="1"/>
+              <a:t>kubernetes</a:t>
+            </a:r>
+            <a:r>
+              <a:rPr lang="en-US" dirty="0"/>
+              <a:t>/solutions. It contains the secret &amp; a pod mounting the secret.</a:t>
+            </a:r>
+          </a:p>
+        </p:txBody>
+      </p:sp>
+      <p:sp>
+        <p:nvSpPr>
+          <p:cNvPr id="4" name="Slide Number Placeholder 3"/>
+          <p:cNvSpPr>
+            <a:spLocks noGrp="1"/>
+          </p:cNvSpPr>
+          <p:nvPr>
+            <p:ph type="sldNum" sz="quarter" idx="10"/>
+          </p:nvPr>
+        </p:nvSpPr>
+        <p:spPr/>
+        <p:txBody>
+          <a:bodyPr/>
+          <a:lstStyle/>
+          <a:p>
+            <a:fld id="{7D8C2C35-2B8A-446E-BEC0-FD36716C29AC}" type="slidenum">
+              <a:rPr lang="en-US" smtClean="0"/>
+              <a:pPr/>
+              <a:t>6</a:t>
+            </a:fld>
+            <a:endParaRPr lang="en-US" dirty="0"/>
+          </a:p>
+        </p:txBody>
+      </p:sp>
+    </p:spTree>
+    <p:extLst>
+      <p:ext uri="{BB962C8B-B14F-4D97-AF65-F5344CB8AC3E}">
+        <p14:creationId xmlns:p14="http://schemas.microsoft.com/office/powerpoint/2010/main" val="2065736834"/>
+      </p:ext>
+    </p:extLst>
+  </p:cSld>
+  <p:clrMapOvr>
+    <a:masterClrMapping/>
+  </p:clrMapOvr>
+</p:notes>
+</file>
+
+<file path=ppt/notesSlides/notesSlide7.xml><?xml version="1.0" encoding="utf-8"?>
+<p:notes xmlns:a="http://schemas.openxmlformats.org/drawingml/2006/main" xmlns:r="http://schemas.openxmlformats.org/officeDocument/2006/relationships" xmlns:p="http://schemas.openxmlformats.org/presentationml/2006/main">
+  <p:cSld>
+    <p:spTree>
+      <p:nvGrpSpPr>
+        <p:cNvPr id="1" name=""/>
+        <p:cNvGrpSpPr/>
+        <p:nvPr/>
+      </p:nvGrpSpPr>
+      <p:grpSpPr>
+        <a:xfrm>
+          <a:off x="0" y="0"/>
+          <a:ext cx="0" cy="0"/>
+          <a:chOff x="0" y="0"/>
+          <a:chExt cx="0" cy="0"/>
+        </a:xfrm>
+      </p:grpSpPr>
+      <p:sp>
+        <p:nvSpPr>
+          <p:cNvPr id="2" name="Slide Image Placeholder 1"/>
+          <p:cNvSpPr>
+            <a:spLocks noGrp="1" noRot="1" noChangeAspect="1"/>
+          </p:cNvSpPr>
+          <p:nvPr>
+            <p:ph type="sldImg"/>
+          </p:nvPr>
+        </p:nvSpPr>
+        <p:spPr/>
+      </p:sp>
+      <p:sp>
+        <p:nvSpPr>
+          <p:cNvPr id="3" name="Notes Placeholder 2"/>
+          <p:cNvSpPr>
+            <a:spLocks noGrp="1"/>
+          </p:cNvSpPr>
+          <p:nvPr>
+            <p:ph type="body" idx="1"/>
+          </p:nvPr>
+        </p:nvSpPr>
+        <p:spPr/>
+        <p:txBody>
+          <a:bodyPr/>
+          <a:lstStyle/>
+          <a:p>
+            <a:r>
+              <a:rPr lang="en-US" dirty="0"/>
+              <a:t>Use the secret like any other volume and bind it to the pod. When mounted into the filesystem the content/values are decoded and available in plain text. So be careful what you do. Eventually you want to set (</a:t>
+            </a:r>
+            <a:r>
+              <a:rPr lang="en-US" dirty="0" err="1"/>
+              <a:t>linux</a:t>
+            </a:r>
+            <a:r>
+              <a:rPr lang="en-US" dirty="0"/>
+              <a:t>) permissions for the files (like 400 so only the owner is allowed to read it).</a:t>
+            </a:r>
+          </a:p>
+        </p:txBody>
+      </p:sp>
+      <p:sp>
+        <p:nvSpPr>
+          <p:cNvPr id="4" name="Slide Number Placeholder 3"/>
+          <p:cNvSpPr>
+            <a:spLocks noGrp="1"/>
+          </p:cNvSpPr>
+          <p:nvPr>
+            <p:ph type="sldNum" sz="quarter" idx="10"/>
+          </p:nvPr>
+        </p:nvSpPr>
+        <p:spPr/>
+        <p:txBody>
+          <a:bodyPr/>
+          <a:lstStyle/>
+          <a:p>
+            <a:fld id="{7D8C2C35-2B8A-446E-BEC0-FD36716C29AC}" type="slidenum">
+              <a:rPr lang="de-DE" smtClean="0"/>
+              <a:pPr/>
+              <a:t>7</a:t>
+            </a:fld>
+            <a:endParaRPr lang="de-DE" dirty="0"/>
+          </a:p>
+        </p:txBody>
+      </p:sp>
+    </p:spTree>
+    <p:extLst>
+      <p:ext uri="{BB962C8B-B14F-4D97-AF65-F5344CB8AC3E}">
+        <p14:creationId xmlns:p14="http://schemas.microsoft.com/office/powerpoint/2010/main" val="4206451847"/>
+      </p:ext>
+    </p:extLst>
+  </p:cSld>
+  <p:clrMapOvr>
+    <a:masterClrMapping/>
+  </p:clrMapOvr>
+</p:notes>
+</file>
+
+<file path=ppt/notesSlides/notesSlide8.xml><?xml version="1.0" encoding="utf-8"?>
 <p:notes xmlns:a="http://schemas.openxmlformats.org/drawingml/2006/main" xmlns:r="http://schemas.openxmlformats.org/officeDocument/2006/relationships" xmlns:p="http://schemas.openxmlformats.org/presentationml/2006/main">
   <p:cSld>
     <p:spTree>
@@ -981,7 +1408,7 @@
             <a:fld id="{7D8C2C35-2B8A-446E-BEC0-FD36716C29AC}" type="slidenum">
               <a:rPr lang="en-US" smtClean="0"/>
               <a:pPr/>
-              <a:t>7</a:t>
+              <a:t>9</a:t>
             </a:fld>
             <a:endParaRPr lang="en-US" dirty="0"/>
           </a:p>
@@ -15099,8 +15526,8 @@
         </p:nvSpPr>
         <p:spPr bwMode="gray">
           <a:xfrm>
-            <a:off x="1470660" y="2682240"/>
-            <a:ext cx="9486900" cy="3825240"/>
+            <a:off x="1935480" y="3025140"/>
+            <a:ext cx="8404860" cy="3451860"/>
           </a:xfrm>
           <a:prstGeom prst="roundRect">
             <a:avLst/>
@@ -15203,8 +15630,8 @@
         </p:nvSpPr>
         <p:spPr bwMode="gray">
           <a:xfrm>
-            <a:off x="2367121" y="3333013"/>
-            <a:ext cx="4125119" cy="2473427"/>
+            <a:off x="2748121" y="3734737"/>
+            <a:ext cx="3370739" cy="2162539"/>
           </a:xfrm>
           <a:prstGeom prst="rect">
             <a:avLst/>
@@ -15278,7 +15705,7 @@
         </p:nvSpPr>
         <p:spPr bwMode="gray">
           <a:xfrm>
-            <a:off x="2177966" y="3278141"/>
+            <a:off x="2295057" y="3575073"/>
             <a:ext cx="1645920" cy="365760"/>
           </a:xfrm>
           <a:prstGeom prst="rect">
@@ -15347,8 +15774,8 @@
         </p:nvSpPr>
         <p:spPr bwMode="gray">
           <a:xfrm>
-            <a:off x="8057213" y="3049541"/>
-            <a:ext cx="1561405" cy="1520039"/>
+            <a:off x="8057213" y="3642360"/>
+            <a:ext cx="1422067" cy="1041520"/>
           </a:xfrm>
           <a:prstGeom prst="can">
             <a:avLst/>
@@ -15420,7 +15847,7 @@
         </p:nvSpPr>
         <p:spPr bwMode="gray">
           <a:xfrm>
-            <a:off x="3615714" y="4147041"/>
+            <a:off x="3615714" y="4261341"/>
             <a:ext cx="1627931" cy="1156258"/>
           </a:xfrm>
           <a:prstGeom prst="rect">
@@ -15537,6 +15964,7 @@
         <p:nvCxnSpPr>
           <p:cNvPr id="8" name="Connector: Elbow 7"/>
           <p:cNvCxnSpPr>
+            <a:cxnSpLocks/>
             <a:stCxn id="7" idx="3"/>
             <a:endCxn id="6" idx="2"/>
           </p:cNvCxnSpPr>
@@ -15544,8 +15972,8 @@
         </p:nvCxnSpPr>
         <p:spPr>
           <a:xfrm flipV="1">
-            <a:off x="5243645" y="3809561"/>
-            <a:ext cx="2813568" cy="915609"/>
+            <a:off x="5243645" y="4163120"/>
+            <a:ext cx="2813568" cy="676350"/>
           </a:xfrm>
           <a:prstGeom prst="bentConnector3">
             <a:avLst>
@@ -15657,8 +16085,8 @@
         </p:nvSpPr>
         <p:spPr bwMode="gray">
           <a:xfrm>
-            <a:off x="8057212" y="4718321"/>
-            <a:ext cx="1561405" cy="1520039"/>
+            <a:off x="8057212" y="5034517"/>
+            <a:ext cx="1422067" cy="1041520"/>
           </a:xfrm>
           <a:prstGeom prst="can">
             <a:avLst/>
@@ -15726,6 +16154,7 @@
         <p:nvCxnSpPr>
           <p:cNvPr id="16" name="Connector: Elbow 15"/>
           <p:cNvCxnSpPr>
+            <a:cxnSpLocks/>
             <a:stCxn id="7" idx="3"/>
             <a:endCxn id="15" idx="2"/>
           </p:cNvCxnSpPr>
@@ -15733,8 +16162,8 @@
         </p:nvCxnSpPr>
         <p:spPr>
           <a:xfrm>
-            <a:off x="5243645" y="4725170"/>
-            <a:ext cx="2813567" cy="753171"/>
+            <a:off x="5243645" y="4839470"/>
+            <a:ext cx="2813567" cy="715807"/>
           </a:xfrm>
           <a:prstGeom prst="bentConnector3">
             <a:avLst>
@@ -15813,22 +16242,23 @@
           <a:lstStyle/>
           <a:p>
             <a:r>
-              <a:rPr lang="en-US" dirty="0"/>
-              <a:t>Secrets</a:t>
-            </a:r>
+              <a:rPr lang="en-US" dirty="0" err="1"/>
+              <a:t>ConfigMaps</a:t>
+            </a:r>
+            <a:endParaRPr lang="en-US" dirty="0"/>
           </a:p>
         </p:txBody>
       </p:sp>
       <p:sp>
         <p:nvSpPr>
-          <p:cNvPr id="3" name="Rectangle 2"/>
+          <p:cNvPr id="4" name="Rectangle 3"/>
           <p:cNvSpPr/>
           <p:nvPr/>
         </p:nvSpPr>
         <p:spPr>
           <a:xfrm>
-            <a:off x="503999" y="1136103"/>
-            <a:ext cx="11186477" cy="1708160"/>
+            <a:off x="504000" y="1090210"/>
+            <a:ext cx="8685720" cy="1384995"/>
           </a:xfrm>
           <a:prstGeom prst="rect">
             <a:avLst/>
@@ -15846,7 +16276,15 @@
             </a:pPr>
             <a:r>
               <a:rPr lang="en-US" dirty="0"/>
-              <a:t>Stores data base64 encoded</a:t>
+              <a:t>Store structured data as files or </a:t>
+            </a:r>
+            <a:r>
+              <a:rPr lang="en-US" dirty="0" err="1"/>
+              <a:t>key:value</a:t>
+            </a:r>
+            <a:r>
+              <a:rPr lang="en-US" dirty="0"/>
+              <a:t> pairs</a:t>
             </a:r>
           </a:p>
           <a:p>
@@ -15856,60 +16294,34 @@
             </a:pPr>
             <a:r>
               <a:rPr lang="en-US" dirty="0"/>
-              <a:t>Is a map-object =&gt; can contain several </a:t>
-            </a:r>
-            <a:r>
-              <a:rPr lang="en-US" dirty="0" err="1"/>
-              <a:t>key:value</a:t>
-            </a:r>
-            <a:r>
-              <a:rPr lang="en-US" dirty="0"/>
-              <a:t> pairs in data section</a:t>
-            </a:r>
-          </a:p>
-          <a:p>
-            <a:pPr marL="342900" indent="-342900">
+              <a:t>make them available to pods </a:t>
+            </a:r>
+          </a:p>
+          <a:p>
+            <a:pPr marL="887288" lvl="1" indent="-342900">
               <a:buFont typeface="Wingdings" panose="05000000000000000000" pitchFamily="2" charset="2"/>
               <a:buChar char="§"/>
             </a:pPr>
             <a:r>
               <a:rPr lang="en-US" dirty="0"/>
-              <a:t>Bound to a namespace</a:t>
-            </a:r>
-          </a:p>
-          <a:p>
-            <a:pPr marL="342900" indent="-342900">
+              <a:t>as environment variables</a:t>
+            </a:r>
+          </a:p>
+          <a:p>
+            <a:pPr marL="887288" lvl="1" indent="-342900">
               <a:buFont typeface="Wingdings" panose="05000000000000000000" pitchFamily="2" charset="2"/>
               <a:buChar char="§"/>
             </a:pPr>
             <a:r>
               <a:rPr lang="en-US" dirty="0"/>
-              <a:t>Can be read by anyone in namespace with watch/list ability</a:t>
-            </a:r>
-          </a:p>
-          <a:p>
-            <a:pPr marL="342900" indent="-342900">
-              <a:buFont typeface="Wingdings" panose="05000000000000000000" pitchFamily="2" charset="2"/>
-              <a:buChar char="§"/>
-            </a:pPr>
-            <a:r>
-              <a:rPr lang="en-US" dirty="0"/>
-              <a:t>Risk: API server / </a:t>
-            </a:r>
-            <a:r>
-              <a:rPr lang="en-US" dirty="0" err="1"/>
-              <a:t>etcd</a:t>
-            </a:r>
-            <a:r>
-              <a:rPr lang="en-US" dirty="0"/>
-              <a:t> potentially store information in plaintext</a:t>
+              <a:t>files as a mountable volume</a:t>
             </a:r>
           </a:p>
         </p:txBody>
       </p:sp>
       <p:pic>
         <p:nvPicPr>
-          <p:cNvPr id="5" name="Picture 4"/>
+          <p:cNvPr id="10" name="Picture 9"/>
           <p:cNvPicPr>
             <a:picLocks noChangeAspect="1"/>
           </p:cNvPicPr>
@@ -15923,8 +16335,8 @@
         </p:blipFill>
         <p:spPr>
           <a:xfrm>
-            <a:off x="503999" y="3335634"/>
-            <a:ext cx="8979546" cy="565806"/>
+            <a:off x="427815" y="2902243"/>
+            <a:ext cx="8761905" cy="400000"/>
           </a:xfrm>
           <a:prstGeom prst="rect">
             <a:avLst/>
@@ -15933,7 +16345,7 @@
       </p:pic>
       <p:pic>
         <p:nvPicPr>
-          <p:cNvPr id="10" name="Picture 9"/>
+          <p:cNvPr id="11" name="Picture 10"/>
           <p:cNvPicPr>
             <a:picLocks noChangeAspect="1"/>
           </p:cNvPicPr>
@@ -15947,8 +16359,32 @@
         </p:blipFill>
         <p:spPr>
           <a:xfrm>
-            <a:off x="503999" y="4380650"/>
-            <a:ext cx="2504762" cy="1647619"/>
+            <a:off x="504000" y="3618397"/>
+            <a:ext cx="3419048" cy="1647619"/>
+          </a:xfrm>
+          <a:prstGeom prst="rect">
+            <a:avLst/>
+          </a:prstGeom>
+        </p:spPr>
+      </p:pic>
+      <p:pic>
+        <p:nvPicPr>
+          <p:cNvPr id="12" name="Picture 11"/>
+          <p:cNvPicPr>
+            <a:picLocks noChangeAspect="1"/>
+          </p:cNvPicPr>
+          <p:nvPr/>
+        </p:nvPicPr>
+        <p:blipFill>
+          <a:blip r:embed="rId5"/>
+          <a:stretch>
+            <a:fillRect/>
+          </a:stretch>
+        </p:blipFill>
+        <p:spPr>
+          <a:xfrm>
+            <a:off x="4439347" y="3618397"/>
+            <a:ext cx="3790254" cy="2840661"/>
           </a:xfrm>
           <a:prstGeom prst="rect">
             <a:avLst/>
@@ -15958,7 +16394,7 @@
     </p:spTree>
     <p:extLst>
       <p:ext uri="{BB962C8B-B14F-4D97-AF65-F5344CB8AC3E}">
-        <p14:creationId xmlns:p14="http://schemas.microsoft.com/office/powerpoint/2010/main" val="2422484332"/>
+        <p14:creationId xmlns:p14="http://schemas.microsoft.com/office/powerpoint/2010/main" val="1966867961"/>
       </p:ext>
     </p:extLst>
   </p:cSld>
@@ -16001,23 +16437,22 @@
           <a:lstStyle/>
           <a:p>
             <a:r>
-              <a:rPr lang="en-US" dirty="0" err="1"/>
-              <a:t>ConfigMaps</a:t>
-            </a:r>
-            <a:endParaRPr lang="en-US" dirty="0"/>
+              <a:rPr lang="en-US" dirty="0"/>
+              <a:t>Secrets</a:t>
+            </a:r>
           </a:p>
         </p:txBody>
       </p:sp>
       <p:sp>
         <p:nvSpPr>
-          <p:cNvPr id="4" name="Rectangle 3"/>
+          <p:cNvPr id="3" name="Rectangle 2"/>
           <p:cNvSpPr/>
           <p:nvPr/>
         </p:nvSpPr>
         <p:spPr>
           <a:xfrm>
-            <a:off x="504000" y="933688"/>
-            <a:ext cx="8685720" cy="1384995"/>
+            <a:off x="503999" y="1136103"/>
+            <a:ext cx="11186477" cy="1384995"/>
           </a:xfrm>
           <a:prstGeom prst="rect">
             <a:avLst/>
@@ -16035,7 +16470,7 @@
             </a:pPr>
             <a:r>
               <a:rPr lang="en-US" dirty="0"/>
-              <a:t>Is a map object</a:t>
+              <a:t>Stores data base64 encoded</a:t>
             </a:r>
           </a:p>
           <a:p>
@@ -16045,7 +16480,15 @@
             </a:pPr>
             <a:r>
               <a:rPr lang="en-US" dirty="0"/>
-              <a:t>Stores information and allows to make them available to pods</a:t>
+              <a:t>Can contain several </a:t>
+            </a:r>
+            <a:r>
+              <a:rPr lang="en-US" dirty="0" err="1"/>
+              <a:t>key:value</a:t>
+            </a:r>
+            <a:r>
+              <a:rPr lang="en-US" dirty="0"/>
+              <a:t> pairs or files in data section</a:t>
             </a:r>
           </a:p>
           <a:p>
@@ -16055,7 +16498,7 @@
             </a:pPr>
             <a:r>
               <a:rPr lang="en-US" dirty="0"/>
-              <a:t>Information can become environment variables or files in a directory</a:t>
+              <a:t>Can be read by anyone in namespace with watch/list ability</a:t>
             </a:r>
           </a:p>
           <a:p>
@@ -16065,14 +16508,863 @@
             </a:pPr>
             <a:r>
               <a:rPr lang="en-US" dirty="0"/>
-              <a:t>Can be created manually with values or from files / directories</a:t>
+              <a:t>Risk: API server / </a:t>
+            </a:r>
+            <a:r>
+              <a:rPr lang="en-US" dirty="0" err="1"/>
+              <a:t>etcd</a:t>
+            </a:r>
+            <a:r>
+              <a:rPr lang="en-US" dirty="0"/>
+              <a:t> potentially store information in plaintext</a:t>
+            </a:r>
+          </a:p>
+        </p:txBody>
+      </p:sp>
+      <p:sp>
+        <p:nvSpPr>
+          <p:cNvPr id="6" name="Cylinder 5">
+            <a:extLst>
+              <a:ext uri="{FF2B5EF4-FFF2-40B4-BE49-F238E27FC236}">
+                <a16:creationId xmlns:a16="http://schemas.microsoft.com/office/drawing/2014/main" id="{8294FB23-16CF-4FCA-926E-9EAC91920FAE}"/>
+              </a:ext>
+            </a:extLst>
+          </p:cNvPr>
+          <p:cNvSpPr/>
+          <p:nvPr/>
+        </p:nvSpPr>
+        <p:spPr bwMode="gray">
+          <a:xfrm>
+            <a:off x="5742336" y="4258173"/>
+            <a:ext cx="1422067" cy="1041520"/>
+          </a:xfrm>
+          <a:prstGeom prst="can">
+            <a:avLst/>
+          </a:prstGeom>
+          <a:ln>
+            <a:headEnd/>
+            <a:tailEnd/>
+          </a:ln>
+        </p:spPr>
+        <p:style>
+          <a:lnRef idx="2">
+            <a:schemeClr val="accent2"/>
+          </a:lnRef>
+          <a:fillRef idx="1">
+            <a:schemeClr val="lt1"/>
+          </a:fillRef>
+          <a:effectRef idx="0">
+            <a:schemeClr val="accent2"/>
+          </a:effectRef>
+          <a:fontRef idx="minor">
+            <a:schemeClr val="dk1"/>
+          </a:fontRef>
+        </p:style>
+        <p:txBody>
+          <a:bodyPr lIns="90000" tIns="72000" rIns="90000" bIns="72000" rtlCol="0" anchor="ctr"/>
+          <a:lstStyle/>
+          <a:p>
+            <a:pPr marR="0" algn="ctr" defTabSz="914400" eaLnBrk="1" fontAlgn="base" latinLnBrk="0" hangingPunct="1">
+              <a:lnSpc>
+                <a:spcPct val="100000"/>
+              </a:lnSpc>
+              <a:spcBef>
+                <a:spcPct val="50000"/>
+              </a:spcBef>
+              <a:spcAft>
+                <a:spcPct val="0"/>
+              </a:spcAft>
+              <a:buClr>
+                <a:srgbClr val="F0AB00"/>
+              </a:buClr>
+              <a:buSzPct val="80000"/>
+              <a:tabLst/>
+            </a:pPr>
+            <a:r>
+              <a:rPr lang="en-US" sz="1800" kern="0" dirty="0">
+                <a:ea typeface="Arial Unicode MS" pitchFamily="34" charset="-128"/>
+                <a:cs typeface="Arial Unicode MS" pitchFamily="34" charset="-128"/>
+              </a:rPr>
+              <a:t>TLS</a:t>
+            </a:r>
+            <a:endParaRPr kumimoji="0" lang="en-US" sz="1800" b="0" i="0" u="none" strike="noStrike" kern="0" cap="none" spc="0" normalizeH="0" baseline="0" noProof="0" dirty="0">
+              <a:ln>
+                <a:noFill/>
+              </a:ln>
+              <a:effectLst/>
+              <a:uLnTx/>
+              <a:uFillTx/>
+              <a:ea typeface="Arial Unicode MS" pitchFamily="34" charset="-128"/>
+              <a:cs typeface="Arial Unicode MS" pitchFamily="34" charset="-128"/>
+            </a:endParaRPr>
+          </a:p>
+        </p:txBody>
+      </p:sp>
+      <p:sp>
+        <p:nvSpPr>
+          <p:cNvPr id="7" name="Cylinder 6">
+            <a:extLst>
+              <a:ext uri="{FF2B5EF4-FFF2-40B4-BE49-F238E27FC236}">
+                <a16:creationId xmlns:a16="http://schemas.microsoft.com/office/drawing/2014/main" id="{4B75FA72-07CA-4510-8061-3E39324D27E0}"/>
+              </a:ext>
+            </a:extLst>
+          </p:cNvPr>
+          <p:cNvSpPr/>
+          <p:nvPr/>
+        </p:nvSpPr>
+        <p:spPr bwMode="gray">
+          <a:xfrm>
+            <a:off x="5742337" y="5554192"/>
+            <a:ext cx="1422067" cy="1041520"/>
+          </a:xfrm>
+          <a:prstGeom prst="can">
+            <a:avLst/>
+          </a:prstGeom>
+          <a:ln>
+            <a:headEnd/>
+            <a:tailEnd/>
+          </a:ln>
+        </p:spPr>
+        <p:style>
+          <a:lnRef idx="2">
+            <a:schemeClr val="accent2"/>
+          </a:lnRef>
+          <a:fillRef idx="1">
+            <a:schemeClr val="lt1"/>
+          </a:fillRef>
+          <a:effectRef idx="0">
+            <a:schemeClr val="accent2"/>
+          </a:effectRef>
+          <a:fontRef idx="minor">
+            <a:schemeClr val="dk1"/>
+          </a:fontRef>
+        </p:style>
+        <p:txBody>
+          <a:bodyPr lIns="90000" tIns="72000" rIns="90000" bIns="72000" rtlCol="0" anchor="ctr"/>
+          <a:lstStyle/>
+          <a:p>
+            <a:pPr marR="0" algn="ctr" defTabSz="914400" eaLnBrk="1" fontAlgn="base" latinLnBrk="0" hangingPunct="1">
+              <a:lnSpc>
+                <a:spcPct val="100000"/>
+              </a:lnSpc>
+              <a:spcBef>
+                <a:spcPct val="50000"/>
+              </a:spcBef>
+              <a:spcAft>
+                <a:spcPct val="0"/>
+              </a:spcAft>
+              <a:buClr>
+                <a:srgbClr val="F0AB00"/>
+              </a:buClr>
+              <a:buSzPct val="80000"/>
+              <a:tabLst/>
+            </a:pPr>
+            <a:r>
+              <a:rPr lang="en-US" sz="1800" kern="0" dirty="0">
+                <a:ea typeface="Arial Unicode MS" pitchFamily="34" charset="-128"/>
+                <a:cs typeface="Arial Unicode MS" pitchFamily="34" charset="-128"/>
+              </a:rPr>
+              <a:t>docker registry</a:t>
+            </a:r>
+            <a:endParaRPr kumimoji="0" lang="en-US" sz="1800" b="0" i="0" u="none" strike="noStrike" kern="0" cap="none" spc="0" normalizeH="0" baseline="0" noProof="0" dirty="0">
+              <a:ln>
+                <a:noFill/>
+              </a:ln>
+              <a:effectLst/>
+              <a:uLnTx/>
+              <a:uFillTx/>
+              <a:ea typeface="Arial Unicode MS" pitchFamily="34" charset="-128"/>
+              <a:cs typeface="Arial Unicode MS" pitchFamily="34" charset="-128"/>
+            </a:endParaRPr>
+          </a:p>
+        </p:txBody>
+      </p:sp>
+      <p:sp>
+        <p:nvSpPr>
+          <p:cNvPr id="8" name="Cylinder 7">
+            <a:extLst>
+              <a:ext uri="{FF2B5EF4-FFF2-40B4-BE49-F238E27FC236}">
+                <a16:creationId xmlns:a16="http://schemas.microsoft.com/office/drawing/2014/main" id="{048893B6-9C1E-43C0-9C96-950FA005000B}"/>
+              </a:ext>
+            </a:extLst>
+          </p:cNvPr>
+          <p:cNvSpPr/>
+          <p:nvPr/>
+        </p:nvSpPr>
+        <p:spPr bwMode="gray">
+          <a:xfrm>
+            <a:off x="5742338" y="2962154"/>
+            <a:ext cx="1422067" cy="1041520"/>
+          </a:xfrm>
+          <a:prstGeom prst="can">
+            <a:avLst/>
+          </a:prstGeom>
+          <a:ln>
+            <a:headEnd/>
+            <a:tailEnd/>
+          </a:ln>
+        </p:spPr>
+        <p:style>
+          <a:lnRef idx="2">
+            <a:schemeClr val="accent2"/>
+          </a:lnRef>
+          <a:fillRef idx="1">
+            <a:schemeClr val="lt1"/>
+          </a:fillRef>
+          <a:effectRef idx="0">
+            <a:schemeClr val="accent2"/>
+          </a:effectRef>
+          <a:fontRef idx="minor">
+            <a:schemeClr val="dk1"/>
+          </a:fontRef>
+        </p:style>
+        <p:txBody>
+          <a:bodyPr lIns="90000" tIns="72000" rIns="90000" bIns="72000" rtlCol="0" anchor="ctr"/>
+          <a:lstStyle/>
+          <a:p>
+            <a:pPr marR="0" algn="ctr" defTabSz="914400" eaLnBrk="1" fontAlgn="base" latinLnBrk="0" hangingPunct="1">
+              <a:lnSpc>
+                <a:spcPct val="100000"/>
+              </a:lnSpc>
+              <a:spcBef>
+                <a:spcPct val="50000"/>
+              </a:spcBef>
+              <a:spcAft>
+                <a:spcPct val="0"/>
+              </a:spcAft>
+              <a:buClr>
+                <a:srgbClr val="F0AB00"/>
+              </a:buClr>
+              <a:buSzPct val="80000"/>
+              <a:tabLst/>
+            </a:pPr>
+            <a:r>
+              <a:rPr lang="en-US" sz="1800" kern="0" dirty="0">
+                <a:ea typeface="Arial Unicode MS" pitchFamily="34" charset="-128"/>
+                <a:cs typeface="Arial Unicode MS" pitchFamily="34" charset="-128"/>
+              </a:rPr>
+              <a:t>generic</a:t>
+            </a:r>
+            <a:endParaRPr kumimoji="0" lang="en-US" sz="1800" b="0" i="0" u="none" strike="noStrike" kern="0" cap="none" spc="0" normalizeH="0" baseline="0" noProof="0" dirty="0">
+              <a:ln>
+                <a:noFill/>
+              </a:ln>
+              <a:effectLst/>
+              <a:uLnTx/>
+              <a:uFillTx/>
+              <a:ea typeface="Arial Unicode MS" pitchFamily="34" charset="-128"/>
+              <a:cs typeface="Arial Unicode MS" pitchFamily="34" charset="-128"/>
+            </a:endParaRPr>
+          </a:p>
+        </p:txBody>
+      </p:sp>
+      <p:sp>
+        <p:nvSpPr>
+          <p:cNvPr id="9" name="Rectangle 8">
+            <a:extLst>
+              <a:ext uri="{FF2B5EF4-FFF2-40B4-BE49-F238E27FC236}">
+                <a16:creationId xmlns:a16="http://schemas.microsoft.com/office/drawing/2014/main" id="{41E95D78-488A-4CCE-BA8C-7C2B88649B17}"/>
+              </a:ext>
+            </a:extLst>
+          </p:cNvPr>
+          <p:cNvSpPr/>
+          <p:nvPr/>
+        </p:nvSpPr>
+        <p:spPr bwMode="gray">
+          <a:xfrm>
+            <a:off x="928945" y="3694669"/>
+            <a:ext cx="3370739" cy="2162539"/>
+          </a:xfrm>
+          <a:prstGeom prst="rect">
+            <a:avLst/>
+          </a:prstGeom>
+          <a:ln>
+            <a:headEnd/>
+            <a:tailEnd/>
+          </a:ln>
+        </p:spPr>
+        <p:style>
+          <a:lnRef idx="2">
+            <a:schemeClr val="accent2">
+              <a:shade val="50000"/>
+            </a:schemeClr>
+          </a:lnRef>
+          <a:fillRef idx="1">
+            <a:schemeClr val="accent2"/>
+          </a:fillRef>
+          <a:effectRef idx="0">
+            <a:schemeClr val="accent2"/>
+          </a:effectRef>
+          <a:fontRef idx="minor">
+            <a:schemeClr val="lt1"/>
+          </a:fontRef>
+        </p:style>
+        <p:txBody>
+          <a:bodyPr lIns="90000" tIns="72000" rIns="90000" bIns="72000" rtlCol="0" anchor="t"/>
+          <a:lstStyle/>
+          <a:p>
+            <a:pPr marR="0" algn="ctr" defTabSz="914400" eaLnBrk="1" fontAlgn="base" latinLnBrk="0" hangingPunct="1">
+              <a:lnSpc>
+                <a:spcPct val="100000"/>
+              </a:lnSpc>
+              <a:spcBef>
+                <a:spcPct val="50000"/>
+              </a:spcBef>
+              <a:spcAft>
+                <a:spcPct val="0"/>
+              </a:spcAft>
+              <a:buClr>
+                <a:srgbClr val="F0AB00"/>
+              </a:buClr>
+              <a:buSzPct val="80000"/>
+              <a:tabLst/>
+            </a:pPr>
+            <a:r>
+              <a:rPr lang="en-US" sz="1600" b="1" kern="0" noProof="0" dirty="0">
+                <a:ea typeface="Arial Unicode MS" pitchFamily="34" charset="-128"/>
+                <a:cs typeface="Arial Unicode MS" pitchFamily="34" charset="-128"/>
+              </a:rPr>
+              <a:t>Pod-A</a:t>
+            </a:r>
+            <a:endParaRPr kumimoji="0" lang="en-US" sz="1600" b="1" i="0" u="none" strike="noStrike" kern="0" cap="none" spc="0" normalizeH="0" baseline="0" noProof="0" dirty="0">
+              <a:ln>
+                <a:noFill/>
+              </a:ln>
+              <a:effectLst/>
+              <a:uLnTx/>
+              <a:uFillTx/>
+              <a:ea typeface="Arial Unicode MS" pitchFamily="34" charset="-128"/>
+              <a:cs typeface="Arial Unicode MS" pitchFamily="34" charset="-128"/>
+            </a:endParaRPr>
+          </a:p>
+        </p:txBody>
+      </p:sp>
+      <p:sp>
+        <p:nvSpPr>
+          <p:cNvPr id="11" name="Rectangle 10">
+            <a:extLst>
+              <a:ext uri="{FF2B5EF4-FFF2-40B4-BE49-F238E27FC236}">
+                <a16:creationId xmlns:a16="http://schemas.microsoft.com/office/drawing/2014/main" id="{637BA9B8-06AE-4B9A-83E3-A4BAB35F098B}"/>
+              </a:ext>
+            </a:extLst>
+          </p:cNvPr>
+          <p:cNvSpPr/>
+          <p:nvPr/>
+        </p:nvSpPr>
+        <p:spPr bwMode="gray">
+          <a:xfrm>
+            <a:off x="1583086" y="4082610"/>
+            <a:ext cx="2062456" cy="1386655"/>
+          </a:xfrm>
+          <a:prstGeom prst="rect">
+            <a:avLst/>
+          </a:prstGeom>
+          <a:ln>
+            <a:headEnd/>
+            <a:tailEnd/>
+          </a:ln>
+        </p:spPr>
+        <p:style>
+          <a:lnRef idx="2">
+            <a:schemeClr val="accent2"/>
+          </a:lnRef>
+          <a:fillRef idx="1">
+            <a:schemeClr val="lt1"/>
+          </a:fillRef>
+          <a:effectRef idx="0">
+            <a:schemeClr val="accent2"/>
+          </a:effectRef>
+          <a:fontRef idx="minor">
+            <a:schemeClr val="dk1"/>
+          </a:fontRef>
+        </p:style>
+        <p:txBody>
+          <a:bodyPr lIns="90000" tIns="72000" rIns="90000" bIns="72000" rtlCol="0" anchor="ctr"/>
+          <a:lstStyle/>
+          <a:p>
+            <a:pPr marR="0" algn="ctr" defTabSz="914400" eaLnBrk="1" fontAlgn="base" latinLnBrk="0" hangingPunct="1">
+              <a:lnSpc>
+                <a:spcPct val="100000"/>
+              </a:lnSpc>
+              <a:spcBef>
+                <a:spcPct val="50000"/>
+              </a:spcBef>
+              <a:spcAft>
+                <a:spcPct val="0"/>
+              </a:spcAft>
+              <a:buClr>
+                <a:srgbClr val="F0AB00"/>
+              </a:buClr>
+              <a:buSzPct val="80000"/>
+              <a:tabLst/>
+            </a:pPr>
+            <a:r>
+              <a:rPr kumimoji="0" lang="en-US" sz="1800" b="0" i="0" u="none" strike="noStrike" kern="0" cap="none" spc="0" normalizeH="0" baseline="0" noProof="0" dirty="0">
+                <a:ln>
+                  <a:noFill/>
+                </a:ln>
+                <a:effectLst/>
+                <a:uLnTx/>
+                <a:uFillTx/>
+                <a:ea typeface="Arial Unicode MS" pitchFamily="34" charset="-128"/>
+                <a:cs typeface="Arial Unicode MS" pitchFamily="34" charset="-128"/>
+              </a:rPr>
+              <a:t>Container</a:t>
+            </a:r>
+          </a:p>
+        </p:txBody>
+      </p:sp>
+      <p:cxnSp>
+        <p:nvCxnSpPr>
+          <p:cNvPr id="12" name="Connector: Elbow 11">
+            <a:extLst>
+              <a:ext uri="{FF2B5EF4-FFF2-40B4-BE49-F238E27FC236}">
+                <a16:creationId xmlns:a16="http://schemas.microsoft.com/office/drawing/2014/main" id="{030B253B-D0F3-4FA5-B725-AE3A8661C898}"/>
+              </a:ext>
+            </a:extLst>
+          </p:cNvPr>
+          <p:cNvCxnSpPr>
+            <a:cxnSpLocks/>
+            <a:stCxn id="9" idx="3"/>
+            <a:endCxn id="8" idx="2"/>
+          </p:cNvCxnSpPr>
+          <p:nvPr/>
+        </p:nvCxnSpPr>
+        <p:spPr>
+          <a:xfrm flipV="1">
+            <a:off x="4299684" y="3482914"/>
+            <a:ext cx="1442654" cy="1293025"/>
+          </a:xfrm>
+          <a:prstGeom prst="bentConnector3">
+            <a:avLst>
+              <a:gd name="adj1" fmla="val 50000"/>
+            </a:avLst>
+          </a:prstGeom>
+          <a:ln w="57150">
+            <a:solidFill>
+              <a:schemeClr val="accent5">
+                <a:lumMod val="60000"/>
+                <a:lumOff val="40000"/>
+              </a:schemeClr>
+            </a:solidFill>
+            <a:headEnd type="triangle"/>
+            <a:tailEnd type="triangle"/>
+          </a:ln>
+        </p:spPr>
+        <p:style>
+          <a:lnRef idx="1">
+            <a:schemeClr val="accent1"/>
+          </a:lnRef>
+          <a:fillRef idx="0">
+            <a:schemeClr val="accent1"/>
+          </a:fillRef>
+          <a:effectRef idx="0">
+            <a:schemeClr val="accent1"/>
+          </a:effectRef>
+          <a:fontRef idx="minor">
+            <a:schemeClr val="tx1"/>
+          </a:fontRef>
+        </p:style>
+      </p:cxnSp>
+      <p:cxnSp>
+        <p:nvCxnSpPr>
+          <p:cNvPr id="15" name="Connector: Elbow 14">
+            <a:extLst>
+              <a:ext uri="{FF2B5EF4-FFF2-40B4-BE49-F238E27FC236}">
+                <a16:creationId xmlns:a16="http://schemas.microsoft.com/office/drawing/2014/main" id="{9B1D3D82-741E-4B4A-B29F-674E8540F651}"/>
+              </a:ext>
+            </a:extLst>
+          </p:cNvPr>
+          <p:cNvCxnSpPr>
+            <a:cxnSpLocks/>
+            <a:stCxn id="9" idx="3"/>
+            <a:endCxn id="6" idx="2"/>
+          </p:cNvCxnSpPr>
+          <p:nvPr/>
+        </p:nvCxnSpPr>
+        <p:spPr>
+          <a:xfrm>
+            <a:off x="4299684" y="4775939"/>
+            <a:ext cx="1442652" cy="2994"/>
+          </a:xfrm>
+          <a:prstGeom prst="bentConnector3">
+            <a:avLst>
+              <a:gd name="adj1" fmla="val 50000"/>
+            </a:avLst>
+          </a:prstGeom>
+          <a:ln w="57150">
+            <a:solidFill>
+              <a:schemeClr val="accent5">
+                <a:lumMod val="60000"/>
+                <a:lumOff val="40000"/>
+              </a:schemeClr>
+            </a:solidFill>
+            <a:headEnd type="triangle"/>
+            <a:tailEnd type="triangle"/>
+          </a:ln>
+        </p:spPr>
+        <p:style>
+          <a:lnRef idx="1">
+            <a:schemeClr val="accent1"/>
+          </a:lnRef>
+          <a:fillRef idx="0">
+            <a:schemeClr val="accent1"/>
+          </a:fillRef>
+          <a:effectRef idx="0">
+            <a:schemeClr val="accent1"/>
+          </a:effectRef>
+          <a:fontRef idx="minor">
+            <a:schemeClr val="tx1"/>
+          </a:fontRef>
+        </p:style>
+      </p:cxnSp>
+      <p:cxnSp>
+        <p:nvCxnSpPr>
+          <p:cNvPr id="18" name="Connector: Elbow 17">
+            <a:extLst>
+              <a:ext uri="{FF2B5EF4-FFF2-40B4-BE49-F238E27FC236}">
+                <a16:creationId xmlns:a16="http://schemas.microsoft.com/office/drawing/2014/main" id="{C035E278-18F3-4C0E-BCA8-05E8E12EC069}"/>
+              </a:ext>
+            </a:extLst>
+          </p:cNvPr>
+          <p:cNvCxnSpPr>
+            <a:cxnSpLocks/>
+            <a:stCxn id="9" idx="3"/>
+            <a:endCxn id="7" idx="2"/>
+          </p:cNvCxnSpPr>
+          <p:nvPr/>
+        </p:nvCxnSpPr>
+        <p:spPr>
+          <a:xfrm>
+            <a:off x="4299684" y="4775939"/>
+            <a:ext cx="1442653" cy="1299013"/>
+          </a:xfrm>
+          <a:prstGeom prst="bentConnector3">
+            <a:avLst>
+              <a:gd name="adj1" fmla="val 50000"/>
+            </a:avLst>
+          </a:prstGeom>
+          <a:ln w="57150">
+            <a:solidFill>
+              <a:schemeClr val="accent5">
+                <a:lumMod val="60000"/>
+                <a:lumOff val="40000"/>
+              </a:schemeClr>
+            </a:solidFill>
+            <a:headEnd type="triangle"/>
+            <a:tailEnd type="triangle"/>
+          </a:ln>
+        </p:spPr>
+        <p:style>
+          <a:lnRef idx="1">
+            <a:schemeClr val="accent1"/>
+          </a:lnRef>
+          <a:fillRef idx="0">
+            <a:schemeClr val="accent1"/>
+          </a:fillRef>
+          <a:effectRef idx="0">
+            <a:schemeClr val="accent1"/>
+          </a:effectRef>
+          <a:fontRef idx="minor">
+            <a:schemeClr val="tx1"/>
+          </a:fontRef>
+        </p:style>
+      </p:cxnSp>
+      <p:sp>
+        <p:nvSpPr>
+          <p:cNvPr id="22" name="Speech Bubble: Rectangle 21">
+            <a:extLst>
+              <a:ext uri="{FF2B5EF4-FFF2-40B4-BE49-F238E27FC236}">
+                <a16:creationId xmlns:a16="http://schemas.microsoft.com/office/drawing/2014/main" id="{B9594814-70E4-4643-9097-9694A9368728}"/>
+              </a:ext>
+            </a:extLst>
+          </p:cNvPr>
+          <p:cNvSpPr/>
+          <p:nvPr/>
+        </p:nvSpPr>
+        <p:spPr bwMode="gray">
+          <a:xfrm>
+            <a:off x="8768615" y="2936034"/>
+            <a:ext cx="1809548" cy="907202"/>
+          </a:xfrm>
+          <a:prstGeom prst="wedgeRectCallout">
+            <a:avLst>
+              <a:gd name="adj1" fmla="val -125328"/>
+              <a:gd name="adj2" fmla="val -98"/>
+            </a:avLst>
+          </a:prstGeom>
+          <a:ln>
+            <a:headEnd/>
+            <a:tailEnd/>
+          </a:ln>
+        </p:spPr>
+        <p:style>
+          <a:lnRef idx="2">
+            <a:schemeClr val="accent2"/>
+          </a:lnRef>
+          <a:fillRef idx="1">
+            <a:schemeClr val="lt1"/>
+          </a:fillRef>
+          <a:effectRef idx="0">
+            <a:schemeClr val="accent2"/>
+          </a:effectRef>
+          <a:fontRef idx="minor">
+            <a:schemeClr val="dk1"/>
+          </a:fontRef>
+        </p:style>
+        <p:txBody>
+          <a:bodyPr lIns="90000" tIns="72000" rIns="90000" bIns="72000" rtlCol="0" anchor="ctr"/>
+          <a:lstStyle/>
+          <a:p>
+            <a:pPr marR="0" algn="ctr" defTabSz="914400" eaLnBrk="1" fontAlgn="base" latinLnBrk="0" hangingPunct="1">
+              <a:lnSpc>
+                <a:spcPct val="100000"/>
+              </a:lnSpc>
+              <a:spcBef>
+                <a:spcPct val="50000"/>
+              </a:spcBef>
+              <a:spcAft>
+                <a:spcPct val="0"/>
+              </a:spcAft>
+              <a:buClr>
+                <a:srgbClr val="F0AB00"/>
+              </a:buClr>
+              <a:buSzPct val="80000"/>
+              <a:tabLst/>
+            </a:pPr>
+            <a:r>
+              <a:rPr kumimoji="0" lang="en-US" sz="1800" b="0" i="0" u="none" strike="noStrike" kern="0" cap="none" spc="0" normalizeH="0" baseline="0" noProof="0" dirty="0">
+                <a:ln>
+                  <a:noFill/>
+                </a:ln>
+                <a:effectLst/>
+                <a:uLnTx/>
+                <a:uFillTx/>
+                <a:ea typeface="Arial Unicode MS" pitchFamily="34" charset="-128"/>
+                <a:cs typeface="Arial Unicode MS" pitchFamily="34" charset="-128"/>
+              </a:rPr>
+              <a:t>Use to store credentials</a:t>
+            </a:r>
+          </a:p>
+        </p:txBody>
+      </p:sp>
+      <p:sp>
+        <p:nvSpPr>
+          <p:cNvPr id="23" name="Speech Bubble: Rectangle 22">
+            <a:extLst>
+              <a:ext uri="{FF2B5EF4-FFF2-40B4-BE49-F238E27FC236}">
+                <a16:creationId xmlns:a16="http://schemas.microsoft.com/office/drawing/2014/main" id="{E738E071-E968-4282-B026-ED0EDDDA645F}"/>
+              </a:ext>
+            </a:extLst>
+          </p:cNvPr>
+          <p:cNvSpPr/>
+          <p:nvPr/>
+        </p:nvSpPr>
+        <p:spPr bwMode="gray">
+          <a:xfrm>
+            <a:off x="8768615" y="4258172"/>
+            <a:ext cx="1809548" cy="907202"/>
+          </a:xfrm>
+          <a:prstGeom prst="wedgeRectCallout">
+            <a:avLst>
+              <a:gd name="adj1" fmla="val -125328"/>
+              <a:gd name="adj2" fmla="val -98"/>
+            </a:avLst>
+          </a:prstGeom>
+          <a:ln>
+            <a:headEnd/>
+            <a:tailEnd/>
+          </a:ln>
+        </p:spPr>
+        <p:style>
+          <a:lnRef idx="2">
+            <a:schemeClr val="accent2"/>
+          </a:lnRef>
+          <a:fillRef idx="1">
+            <a:schemeClr val="lt1"/>
+          </a:fillRef>
+          <a:effectRef idx="0">
+            <a:schemeClr val="accent2"/>
+          </a:effectRef>
+          <a:fontRef idx="minor">
+            <a:schemeClr val="dk1"/>
+          </a:fontRef>
+        </p:style>
+        <p:txBody>
+          <a:bodyPr lIns="90000" tIns="72000" rIns="90000" bIns="72000" rtlCol="0" anchor="ctr"/>
+          <a:lstStyle/>
+          <a:p>
+            <a:pPr marR="0" algn="ctr" defTabSz="914400" eaLnBrk="1" fontAlgn="base" latinLnBrk="0" hangingPunct="1">
+              <a:lnSpc>
+                <a:spcPct val="100000"/>
+              </a:lnSpc>
+              <a:spcBef>
+                <a:spcPct val="50000"/>
+              </a:spcBef>
+              <a:spcAft>
+                <a:spcPct val="0"/>
+              </a:spcAft>
+              <a:buClr>
+                <a:srgbClr val="F0AB00"/>
+              </a:buClr>
+              <a:buSzPct val="80000"/>
+              <a:tabLst/>
+            </a:pPr>
+            <a:r>
+              <a:rPr kumimoji="0" lang="en-US" sz="1800" b="0" i="0" u="none" strike="noStrike" kern="0" cap="none" spc="0" normalizeH="0" baseline="0" noProof="0" dirty="0">
+                <a:ln>
+                  <a:noFill/>
+                </a:ln>
+                <a:effectLst/>
+                <a:uLnTx/>
+                <a:uFillTx/>
+                <a:ea typeface="Arial Unicode MS" pitchFamily="34" charset="-128"/>
+                <a:cs typeface="Arial Unicode MS" pitchFamily="34" charset="-128"/>
+              </a:rPr>
+              <a:t>Use to store certificates</a:t>
+            </a:r>
+          </a:p>
+        </p:txBody>
+      </p:sp>
+      <p:sp>
+        <p:nvSpPr>
+          <p:cNvPr id="24" name="Speech Bubble: Rectangle 23">
+            <a:extLst>
+              <a:ext uri="{FF2B5EF4-FFF2-40B4-BE49-F238E27FC236}">
+                <a16:creationId xmlns:a16="http://schemas.microsoft.com/office/drawing/2014/main" id="{93CC1797-AAE7-4AC9-8788-CFE549EA58B3}"/>
+              </a:ext>
+            </a:extLst>
+          </p:cNvPr>
+          <p:cNvSpPr/>
+          <p:nvPr/>
+        </p:nvSpPr>
+        <p:spPr bwMode="gray">
+          <a:xfrm>
+            <a:off x="8768614" y="5580309"/>
+            <a:ext cx="1809549" cy="1099623"/>
+          </a:xfrm>
+          <a:prstGeom prst="wedgeRectCallout">
+            <a:avLst>
+              <a:gd name="adj1" fmla="val -125328"/>
+              <a:gd name="adj2" fmla="val -98"/>
+            </a:avLst>
+          </a:prstGeom>
+          <a:ln>
+            <a:headEnd/>
+            <a:tailEnd/>
+          </a:ln>
+        </p:spPr>
+        <p:style>
+          <a:lnRef idx="2">
+            <a:schemeClr val="accent2"/>
+          </a:lnRef>
+          <a:fillRef idx="1">
+            <a:schemeClr val="lt1"/>
+          </a:fillRef>
+          <a:effectRef idx="0">
+            <a:schemeClr val="accent2"/>
+          </a:effectRef>
+          <a:fontRef idx="minor">
+            <a:schemeClr val="dk1"/>
+          </a:fontRef>
+        </p:style>
+        <p:txBody>
+          <a:bodyPr lIns="90000" tIns="72000" rIns="90000" bIns="72000" rtlCol="0" anchor="ctr"/>
+          <a:lstStyle/>
+          <a:p>
+            <a:pPr marR="0" algn="ctr" defTabSz="914400" eaLnBrk="1" fontAlgn="base" latinLnBrk="0" hangingPunct="1">
+              <a:lnSpc>
+                <a:spcPct val="100000"/>
+              </a:lnSpc>
+              <a:spcBef>
+                <a:spcPct val="50000"/>
+              </a:spcBef>
+              <a:spcAft>
+                <a:spcPct val="0"/>
+              </a:spcAft>
+              <a:buClr>
+                <a:srgbClr val="F0AB00"/>
+              </a:buClr>
+              <a:buSzPct val="80000"/>
+              <a:tabLst/>
+            </a:pPr>
+            <a:r>
+              <a:rPr kumimoji="0" lang="en-US" sz="1800" b="0" i="0" u="none" strike="noStrike" kern="0" cap="none" spc="0" normalizeH="0" baseline="0" noProof="0" dirty="0">
+                <a:ln>
+                  <a:noFill/>
+                </a:ln>
+                <a:effectLst/>
+                <a:uLnTx/>
+                <a:uFillTx/>
+                <a:ea typeface="Arial Unicode MS" pitchFamily="34" charset="-128"/>
+                <a:cs typeface="Arial Unicode MS" pitchFamily="34" charset="-128"/>
+              </a:rPr>
+              <a:t>Use to store credentials to a docker registry</a:t>
+            </a:r>
+          </a:p>
+        </p:txBody>
+      </p:sp>
+    </p:spTree>
+    <p:extLst>
+      <p:ext uri="{BB962C8B-B14F-4D97-AF65-F5344CB8AC3E}">
+        <p14:creationId xmlns:p14="http://schemas.microsoft.com/office/powerpoint/2010/main" val="2422484332"/>
+      </p:ext>
+    </p:extLst>
+  </p:cSld>
+  <p:clrMapOvr>
+    <a:masterClrMapping/>
+  </p:clrMapOvr>
+</p:sld>
+</file>
+
+<file path=ppt/slides/slide6.xml><?xml version="1.0" encoding="utf-8"?>
+<p:sld xmlns:a="http://schemas.openxmlformats.org/drawingml/2006/main" xmlns:r="http://schemas.openxmlformats.org/officeDocument/2006/relationships" xmlns:p="http://schemas.openxmlformats.org/presentationml/2006/main">
+  <p:cSld>
+    <p:spTree>
+      <p:nvGrpSpPr>
+        <p:cNvPr id="1" name=""/>
+        <p:cNvGrpSpPr/>
+        <p:nvPr/>
+      </p:nvGrpSpPr>
+      <p:grpSpPr>
+        <a:xfrm>
+          <a:off x="0" y="0"/>
+          <a:ext cx="0" cy="0"/>
+          <a:chOff x="0" y="0"/>
+          <a:chExt cx="0" cy="0"/>
+        </a:xfrm>
+      </p:grpSpPr>
+      <p:sp>
+        <p:nvSpPr>
+          <p:cNvPr id="2" name="Title 1"/>
+          <p:cNvSpPr>
+            <a:spLocks noGrp="1"/>
+          </p:cNvSpPr>
+          <p:nvPr>
+            <p:ph type="title"/>
+          </p:nvPr>
+        </p:nvSpPr>
+        <p:spPr/>
+        <p:txBody>
+          <a:bodyPr/>
+          <a:lstStyle/>
+          <a:p>
+            <a:r>
+              <a:rPr lang="en-US" dirty="0"/>
+              <a:t>Create a secret</a:t>
             </a:r>
           </a:p>
         </p:txBody>
       </p:sp>
       <p:pic>
         <p:nvPicPr>
-          <p:cNvPr id="10" name="Picture 9"/>
+          <p:cNvPr id="6" name="Picture 5">
+            <a:extLst>
+              <a:ext uri="{FF2B5EF4-FFF2-40B4-BE49-F238E27FC236}">
+                <a16:creationId xmlns:a16="http://schemas.microsoft.com/office/drawing/2014/main" id="{A64A0983-8908-410E-8258-78B647CD7BAF}"/>
+              </a:ext>
+            </a:extLst>
+          </p:cNvPr>
           <p:cNvPicPr>
             <a:picLocks noChangeAspect="1"/>
           </p:cNvPicPr>
@@ -16086,8 +17378,8 @@
         </p:blipFill>
         <p:spPr>
           <a:xfrm>
-            <a:off x="504000" y="2489860"/>
-            <a:ext cx="8761905" cy="400000"/>
+            <a:off x="504001" y="1149652"/>
+            <a:ext cx="3619048" cy="1323810"/>
           </a:xfrm>
           <a:prstGeom prst="rect">
             <a:avLst/>
@@ -16096,7 +17388,13 @@
       </p:pic>
       <p:pic>
         <p:nvPicPr>
-          <p:cNvPr id="11" name="Picture 10"/>
+          <p:cNvPr id="8" name="Picture 7">
+            <a:extLst>
+              <a:ext uri="{FF2B5EF4-FFF2-40B4-BE49-F238E27FC236}">
+                <a16:creationId xmlns:a16="http://schemas.microsoft.com/office/drawing/2014/main" id="{CE29B65D-766E-4A9E-830D-9DC44572E827}"/>
+              </a:ext>
+            </a:extLst>
+          </p:cNvPr>
           <p:cNvPicPr>
             <a:picLocks noChangeAspect="1"/>
           </p:cNvPicPr>
@@ -16110,8 +17408,8 @@
         </p:blipFill>
         <p:spPr>
           <a:xfrm>
-            <a:off x="504000" y="3207170"/>
-            <a:ext cx="3419048" cy="1647619"/>
+            <a:off x="504001" y="2584615"/>
+            <a:ext cx="10447619" cy="495238"/>
           </a:xfrm>
           <a:prstGeom prst="rect">
             <a:avLst/>
@@ -16120,7 +17418,13 @@
       </p:pic>
       <p:pic>
         <p:nvPicPr>
-          <p:cNvPr id="12" name="Picture 11"/>
+          <p:cNvPr id="9" name="Picture 8">
+            <a:extLst>
+              <a:ext uri="{FF2B5EF4-FFF2-40B4-BE49-F238E27FC236}">
+                <a16:creationId xmlns:a16="http://schemas.microsoft.com/office/drawing/2014/main" id="{12247954-3655-490C-A8E1-20BD64D274F6}"/>
+              </a:ext>
+            </a:extLst>
+          </p:cNvPr>
           <p:cNvPicPr>
             <a:picLocks noChangeAspect="1"/>
           </p:cNvPicPr>
@@ -16134,18 +17438,256 @@
         </p:blipFill>
         <p:spPr>
           <a:xfrm>
-            <a:off x="4818286" y="3034873"/>
-            <a:ext cx="4447619" cy="3333333"/>
+            <a:off x="504001" y="3191006"/>
+            <a:ext cx="6295238" cy="3085714"/>
           </a:xfrm>
           <a:prstGeom prst="rect">
             <a:avLst/>
           </a:prstGeom>
         </p:spPr>
       </p:pic>
+      <p:sp>
+        <p:nvSpPr>
+          <p:cNvPr id="12" name="Speech Bubble: Rectangle 11">
+            <a:extLst>
+              <a:ext uri="{FF2B5EF4-FFF2-40B4-BE49-F238E27FC236}">
+                <a16:creationId xmlns:a16="http://schemas.microsoft.com/office/drawing/2014/main" id="{8A9DB308-208D-4F12-91C7-B862DAD69F37}"/>
+              </a:ext>
+            </a:extLst>
+          </p:cNvPr>
+          <p:cNvSpPr/>
+          <p:nvPr/>
+        </p:nvSpPr>
+        <p:spPr bwMode="gray">
+          <a:xfrm>
+            <a:off x="5727810" y="984485"/>
+            <a:ext cx="1809548" cy="907202"/>
+          </a:xfrm>
+          <a:prstGeom prst="wedgeRectCallout">
+            <a:avLst>
+              <a:gd name="adj1" fmla="val -125328"/>
+              <a:gd name="adj2" fmla="val -98"/>
+            </a:avLst>
+          </a:prstGeom>
+          <a:ln>
+            <a:headEnd/>
+            <a:tailEnd/>
+          </a:ln>
+        </p:spPr>
+        <p:style>
+          <a:lnRef idx="2">
+            <a:schemeClr val="accent2"/>
+          </a:lnRef>
+          <a:fillRef idx="1">
+            <a:schemeClr val="lt1"/>
+          </a:fillRef>
+          <a:effectRef idx="0">
+            <a:schemeClr val="accent2"/>
+          </a:effectRef>
+          <a:fontRef idx="minor">
+            <a:schemeClr val="dk1"/>
+          </a:fontRef>
+        </p:style>
+        <p:txBody>
+          <a:bodyPr lIns="90000" tIns="72000" rIns="90000" bIns="72000" rtlCol="0" anchor="ctr"/>
+          <a:lstStyle/>
+          <a:p>
+            <a:pPr marR="0" algn="ctr" defTabSz="914400" eaLnBrk="1" fontAlgn="base" latinLnBrk="0" hangingPunct="1">
+              <a:lnSpc>
+                <a:spcPct val="100000"/>
+              </a:lnSpc>
+              <a:spcBef>
+                <a:spcPct val="50000"/>
+              </a:spcBef>
+              <a:spcAft>
+                <a:spcPct val="0"/>
+              </a:spcAft>
+              <a:buClr>
+                <a:srgbClr val="F0AB00"/>
+              </a:buClr>
+              <a:buSzPct val="80000"/>
+              <a:tabLst/>
+            </a:pPr>
+            <a:r>
+              <a:rPr lang="en-US" sz="1800" kern="0" dirty="0">
+                <a:ea typeface="Arial Unicode MS" pitchFamily="34" charset="-128"/>
+                <a:cs typeface="Arial Unicode MS" pitchFamily="34" charset="-128"/>
+              </a:rPr>
+              <a:t>Store credentials in a files</a:t>
+            </a:r>
+            <a:endParaRPr kumimoji="0" lang="en-US" sz="1800" b="0" i="0" u="none" strike="noStrike" kern="0" cap="none" spc="0" normalizeH="0" baseline="0" noProof="0" dirty="0">
+              <a:ln>
+                <a:noFill/>
+              </a:ln>
+              <a:effectLst/>
+              <a:uLnTx/>
+              <a:uFillTx/>
+              <a:ea typeface="Arial Unicode MS" pitchFamily="34" charset="-128"/>
+              <a:cs typeface="Arial Unicode MS" pitchFamily="34" charset="-128"/>
+            </a:endParaRPr>
+          </a:p>
+        </p:txBody>
+      </p:sp>
+      <p:sp>
+        <p:nvSpPr>
+          <p:cNvPr id="13" name="Speech Bubble: Rectangle 12">
+            <a:extLst>
+              <a:ext uri="{FF2B5EF4-FFF2-40B4-BE49-F238E27FC236}">
+                <a16:creationId xmlns:a16="http://schemas.microsoft.com/office/drawing/2014/main" id="{F3F2FDBA-9FBE-4BA2-8141-1A7C24E601B3}"/>
+              </a:ext>
+            </a:extLst>
+          </p:cNvPr>
+          <p:cNvSpPr/>
+          <p:nvPr/>
+        </p:nvSpPr>
+        <p:spPr bwMode="gray">
+          <a:xfrm>
+            <a:off x="9692640" y="3398047"/>
+            <a:ext cx="1809548" cy="907202"/>
+          </a:xfrm>
+          <a:prstGeom prst="wedgeRectCallout">
+            <a:avLst>
+              <a:gd name="adj1" fmla="val -102988"/>
+              <a:gd name="adj2" fmla="val -89221"/>
+            </a:avLst>
+          </a:prstGeom>
+          <a:ln>
+            <a:headEnd/>
+            <a:tailEnd/>
+          </a:ln>
+        </p:spPr>
+        <p:style>
+          <a:lnRef idx="2">
+            <a:schemeClr val="accent2"/>
+          </a:lnRef>
+          <a:fillRef idx="1">
+            <a:schemeClr val="lt1"/>
+          </a:fillRef>
+          <a:effectRef idx="0">
+            <a:schemeClr val="accent2"/>
+          </a:effectRef>
+          <a:fontRef idx="minor">
+            <a:schemeClr val="dk1"/>
+          </a:fontRef>
+        </p:style>
+        <p:txBody>
+          <a:bodyPr lIns="90000" tIns="72000" rIns="90000" bIns="72000" rtlCol="0" anchor="ctr"/>
+          <a:lstStyle/>
+          <a:p>
+            <a:pPr marR="0" algn="ctr" defTabSz="914400" eaLnBrk="1" fontAlgn="base" latinLnBrk="0" hangingPunct="1">
+              <a:lnSpc>
+                <a:spcPct val="100000"/>
+              </a:lnSpc>
+              <a:spcBef>
+                <a:spcPct val="50000"/>
+              </a:spcBef>
+              <a:spcAft>
+                <a:spcPct val="0"/>
+              </a:spcAft>
+              <a:buClr>
+                <a:srgbClr val="F0AB00"/>
+              </a:buClr>
+              <a:buSzPct val="80000"/>
+              <a:tabLst/>
+            </a:pPr>
+            <a:r>
+              <a:rPr kumimoji="0" lang="en-US" sz="1800" b="0" i="0" u="none" strike="noStrike" kern="0" cap="none" spc="0" normalizeH="0" baseline="0" noProof="0" dirty="0">
+                <a:ln>
+                  <a:noFill/>
+                </a:ln>
+                <a:effectLst/>
+                <a:uLnTx/>
+                <a:uFillTx/>
+                <a:ea typeface="Arial Unicode MS" pitchFamily="34" charset="-128"/>
+                <a:cs typeface="Arial Unicode MS" pitchFamily="34" charset="-128"/>
+              </a:rPr>
+              <a:t>Create secret</a:t>
+            </a:r>
+          </a:p>
+        </p:txBody>
+      </p:sp>
+      <p:sp>
+        <p:nvSpPr>
+          <p:cNvPr id="14" name="Speech Bubble: Rectangle 13">
+            <a:extLst>
+              <a:ext uri="{FF2B5EF4-FFF2-40B4-BE49-F238E27FC236}">
+                <a16:creationId xmlns:a16="http://schemas.microsoft.com/office/drawing/2014/main" id="{6DA407EF-632C-4834-A7AF-7E5FD731D332}"/>
+              </a:ext>
+            </a:extLst>
+          </p:cNvPr>
+          <p:cNvSpPr/>
+          <p:nvPr/>
+        </p:nvSpPr>
+        <p:spPr bwMode="gray">
+          <a:xfrm>
+            <a:off x="6908029" y="4102796"/>
+            <a:ext cx="1809548" cy="907202"/>
+          </a:xfrm>
+          <a:prstGeom prst="wedgeRectCallout">
+            <a:avLst>
+              <a:gd name="adj1" fmla="val -170009"/>
+              <a:gd name="adj2" fmla="val -54208"/>
+            </a:avLst>
+          </a:prstGeom>
+          <a:ln>
+            <a:headEnd/>
+            <a:tailEnd/>
+          </a:ln>
+        </p:spPr>
+        <p:style>
+          <a:lnRef idx="2">
+            <a:schemeClr val="accent2"/>
+          </a:lnRef>
+          <a:fillRef idx="1">
+            <a:schemeClr val="lt1"/>
+          </a:fillRef>
+          <a:effectRef idx="0">
+            <a:schemeClr val="accent2"/>
+          </a:effectRef>
+          <a:fontRef idx="minor">
+            <a:schemeClr val="dk1"/>
+          </a:fontRef>
+        </p:style>
+        <p:txBody>
+          <a:bodyPr lIns="90000" tIns="72000" rIns="90000" bIns="72000" rtlCol="0" anchor="ctr"/>
+          <a:lstStyle/>
+          <a:p>
+            <a:pPr marR="0" algn="ctr" defTabSz="914400" eaLnBrk="1" fontAlgn="base" latinLnBrk="0" hangingPunct="1">
+              <a:lnSpc>
+                <a:spcPct val="100000"/>
+              </a:lnSpc>
+              <a:spcBef>
+                <a:spcPct val="50000"/>
+              </a:spcBef>
+              <a:spcAft>
+                <a:spcPct val="0"/>
+              </a:spcAft>
+              <a:buClr>
+                <a:srgbClr val="F0AB00"/>
+              </a:buClr>
+              <a:buSzPct val="80000"/>
+              <a:tabLst/>
+            </a:pPr>
+            <a:r>
+              <a:rPr kumimoji="0" lang="en-US" sz="1800" b="0" i="0" u="none" strike="noStrike" kern="0" cap="none" spc="0" normalizeH="0" baseline="0" noProof="0" dirty="0">
+                <a:ln>
+                  <a:noFill/>
+                </a:ln>
+                <a:effectLst/>
+                <a:uLnTx/>
+                <a:uFillTx/>
+                <a:ea typeface="Arial Unicode MS" pitchFamily="34" charset="-128"/>
+                <a:cs typeface="Arial Unicode MS" pitchFamily="34" charset="-128"/>
+              </a:rPr>
+              <a:t>Base64 encoded data</a:t>
+            </a:r>
+          </a:p>
+        </p:txBody>
+      </p:sp>
     </p:spTree>
     <p:extLst>
       <p:ext uri="{BB962C8B-B14F-4D97-AF65-F5344CB8AC3E}">
-        <p14:creationId xmlns:p14="http://schemas.microsoft.com/office/powerpoint/2010/main" val="1966867961"/>
+        <p14:creationId xmlns:p14="http://schemas.microsoft.com/office/powerpoint/2010/main" val="3680444501"/>
       </p:ext>
     </p:extLst>
   </p:cSld>
@@ -16155,7 +17697,466 @@
 </p:sld>
 </file>
 
-<file path=ppt/slides/slide6.xml><?xml version="1.0" encoding="utf-8"?>
+<file path=ppt/slides/slide7.xml><?xml version="1.0" encoding="utf-8"?>
+<p:sld xmlns:a="http://schemas.openxmlformats.org/drawingml/2006/main" xmlns:r="http://schemas.openxmlformats.org/officeDocument/2006/relationships" xmlns:p="http://schemas.openxmlformats.org/presentationml/2006/main">
+  <p:cSld>
+    <p:spTree>
+      <p:nvGrpSpPr>
+        <p:cNvPr id="1" name=""/>
+        <p:cNvGrpSpPr/>
+        <p:nvPr/>
+      </p:nvGrpSpPr>
+      <p:grpSpPr>
+        <a:xfrm>
+          <a:off x="0" y="0"/>
+          <a:ext cx="0" cy="0"/>
+          <a:chOff x="0" y="0"/>
+          <a:chExt cx="0" cy="0"/>
+        </a:xfrm>
+      </p:grpSpPr>
+      <p:sp>
+        <p:nvSpPr>
+          <p:cNvPr id="2" name="Title 1">
+            <a:extLst>
+              <a:ext uri="{FF2B5EF4-FFF2-40B4-BE49-F238E27FC236}">
+                <a16:creationId xmlns:a16="http://schemas.microsoft.com/office/drawing/2014/main" id="{A4570E81-20A4-4880-8D70-C6B7387E5C47}"/>
+              </a:ext>
+            </a:extLst>
+          </p:cNvPr>
+          <p:cNvSpPr>
+            <a:spLocks noGrp="1"/>
+          </p:cNvSpPr>
+          <p:nvPr>
+            <p:ph type="title"/>
+          </p:nvPr>
+        </p:nvSpPr>
+        <p:spPr/>
+        <p:txBody>
+          <a:bodyPr/>
+          <a:lstStyle/>
+          <a:p>
+            <a:r>
+              <a:rPr lang="en-US" dirty="0"/>
+              <a:t>Use a secret in a pod</a:t>
+            </a:r>
+          </a:p>
+        </p:txBody>
+      </p:sp>
+      <p:pic>
+        <p:nvPicPr>
+          <p:cNvPr id="3" name="Picture 2">
+            <a:extLst>
+              <a:ext uri="{FF2B5EF4-FFF2-40B4-BE49-F238E27FC236}">
+                <a16:creationId xmlns:a16="http://schemas.microsoft.com/office/drawing/2014/main" id="{15188F21-E20E-4BCE-9EB8-E965780885D3}"/>
+              </a:ext>
+            </a:extLst>
+          </p:cNvPr>
+          <p:cNvPicPr>
+            <a:picLocks noChangeAspect="1"/>
+          </p:cNvPicPr>
+          <p:nvPr/>
+        </p:nvPicPr>
+        <p:blipFill>
+          <a:blip r:embed="rId3"/>
+          <a:stretch>
+            <a:fillRect/>
+          </a:stretch>
+        </p:blipFill>
+        <p:spPr>
+          <a:xfrm>
+            <a:off x="504001" y="1180605"/>
+            <a:ext cx="7167334" cy="4058825"/>
+          </a:xfrm>
+          <a:prstGeom prst="rect">
+            <a:avLst/>
+          </a:prstGeom>
+        </p:spPr>
+      </p:pic>
+      <p:pic>
+        <p:nvPicPr>
+          <p:cNvPr id="4" name="Picture 3">
+            <a:extLst>
+              <a:ext uri="{FF2B5EF4-FFF2-40B4-BE49-F238E27FC236}">
+                <a16:creationId xmlns:a16="http://schemas.microsoft.com/office/drawing/2014/main" id="{E904C48C-D92C-42E7-B728-1025936293E9}"/>
+              </a:ext>
+            </a:extLst>
+          </p:cNvPr>
+          <p:cNvPicPr>
+            <a:picLocks noChangeAspect="1"/>
+          </p:cNvPicPr>
+          <p:nvPr/>
+        </p:nvPicPr>
+        <p:blipFill>
+          <a:blip r:embed="rId4"/>
+          <a:stretch>
+            <a:fillRect/>
+          </a:stretch>
+        </p:blipFill>
+        <p:spPr>
+          <a:xfrm>
+            <a:off x="504001" y="5494140"/>
+            <a:ext cx="2800000" cy="685714"/>
+          </a:xfrm>
+          <a:prstGeom prst="rect">
+            <a:avLst/>
+          </a:prstGeom>
+        </p:spPr>
+      </p:pic>
+      <p:sp>
+        <p:nvSpPr>
+          <p:cNvPr id="5" name="Speech Bubble: Rectangle 4">
+            <a:extLst>
+              <a:ext uri="{FF2B5EF4-FFF2-40B4-BE49-F238E27FC236}">
+                <a16:creationId xmlns:a16="http://schemas.microsoft.com/office/drawing/2014/main" id="{A169D62D-E85D-4218-8F74-C5F7A757066C}"/>
+              </a:ext>
+            </a:extLst>
+          </p:cNvPr>
+          <p:cNvSpPr/>
+          <p:nvPr/>
+        </p:nvSpPr>
+        <p:spPr bwMode="gray">
+          <a:xfrm>
+            <a:off x="8120808" y="3975675"/>
+            <a:ext cx="2707609" cy="1127848"/>
+          </a:xfrm>
+          <a:prstGeom prst="wedgeRectCallout">
+            <a:avLst>
+              <a:gd name="adj1" fmla="val -160246"/>
+              <a:gd name="adj2" fmla="val 26381"/>
+            </a:avLst>
+          </a:prstGeom>
+          <a:ln>
+            <a:headEnd/>
+            <a:tailEnd/>
+          </a:ln>
+        </p:spPr>
+        <p:style>
+          <a:lnRef idx="2">
+            <a:schemeClr val="accent2"/>
+          </a:lnRef>
+          <a:fillRef idx="1">
+            <a:schemeClr val="lt1"/>
+          </a:fillRef>
+          <a:effectRef idx="0">
+            <a:schemeClr val="accent2"/>
+          </a:effectRef>
+          <a:fontRef idx="minor">
+            <a:schemeClr val="dk1"/>
+          </a:fontRef>
+        </p:style>
+        <p:txBody>
+          <a:bodyPr lIns="90000" tIns="72000" rIns="90000" bIns="72000" rtlCol="0" anchor="ctr"/>
+          <a:lstStyle/>
+          <a:p>
+            <a:pPr marR="0" algn="ctr" defTabSz="914400" eaLnBrk="1" fontAlgn="base" latinLnBrk="0" hangingPunct="1">
+              <a:lnSpc>
+                <a:spcPct val="100000"/>
+              </a:lnSpc>
+              <a:spcBef>
+                <a:spcPct val="50000"/>
+              </a:spcBef>
+              <a:spcAft>
+                <a:spcPct val="0"/>
+              </a:spcAft>
+              <a:buClr>
+                <a:srgbClr val="F0AB00"/>
+              </a:buClr>
+              <a:buSzPct val="80000"/>
+              <a:tabLst/>
+            </a:pPr>
+            <a:r>
+              <a:rPr lang="en-US" sz="1800" kern="0" dirty="0">
+                <a:ea typeface="Arial Unicode MS" pitchFamily="34" charset="-128"/>
+                <a:cs typeface="Arial Unicode MS" pitchFamily="34" charset="-128"/>
+              </a:rPr>
+              <a:t>Mount the secret read-only to a directory</a:t>
+            </a:r>
+            <a:endParaRPr kumimoji="0" lang="en-US" sz="1800" b="0" i="0" u="none" strike="noStrike" kern="0" cap="none" spc="0" normalizeH="0" baseline="0" noProof="0" dirty="0">
+              <a:ln>
+                <a:noFill/>
+              </a:ln>
+              <a:effectLst/>
+              <a:uLnTx/>
+              <a:uFillTx/>
+              <a:ea typeface="Arial Unicode MS" pitchFamily="34" charset="-128"/>
+              <a:cs typeface="Arial Unicode MS" pitchFamily="34" charset="-128"/>
+            </a:endParaRPr>
+          </a:p>
+        </p:txBody>
+      </p:sp>
+      <p:sp>
+        <p:nvSpPr>
+          <p:cNvPr id="6" name="Speech Bubble: Rectangle 5">
+            <a:extLst>
+              <a:ext uri="{FF2B5EF4-FFF2-40B4-BE49-F238E27FC236}">
+                <a16:creationId xmlns:a16="http://schemas.microsoft.com/office/drawing/2014/main" id="{1E82EF67-D8A0-400E-A711-F57A368C4505}"/>
+              </a:ext>
+            </a:extLst>
+          </p:cNvPr>
+          <p:cNvSpPr/>
+          <p:nvPr/>
+        </p:nvSpPr>
+        <p:spPr bwMode="gray">
+          <a:xfrm>
+            <a:off x="8120808" y="938745"/>
+            <a:ext cx="2707609" cy="1127848"/>
+          </a:xfrm>
+          <a:prstGeom prst="wedgeRectCallout">
+            <a:avLst>
+              <a:gd name="adj1" fmla="val -161668"/>
+              <a:gd name="adj2" fmla="val 66491"/>
+            </a:avLst>
+          </a:prstGeom>
+          <a:ln>
+            <a:headEnd/>
+            <a:tailEnd/>
+          </a:ln>
+        </p:spPr>
+        <p:style>
+          <a:lnRef idx="2">
+            <a:schemeClr val="accent2"/>
+          </a:lnRef>
+          <a:fillRef idx="1">
+            <a:schemeClr val="lt1"/>
+          </a:fillRef>
+          <a:effectRef idx="0">
+            <a:schemeClr val="accent2"/>
+          </a:effectRef>
+          <a:fontRef idx="minor">
+            <a:schemeClr val="dk1"/>
+          </a:fontRef>
+        </p:style>
+        <p:txBody>
+          <a:bodyPr lIns="90000" tIns="72000" rIns="90000" bIns="72000" rtlCol="0" anchor="ctr"/>
+          <a:lstStyle/>
+          <a:p>
+            <a:pPr marR="0" algn="ctr" defTabSz="914400" eaLnBrk="1" fontAlgn="base" latinLnBrk="0" hangingPunct="1">
+              <a:lnSpc>
+                <a:spcPct val="100000"/>
+              </a:lnSpc>
+              <a:spcBef>
+                <a:spcPct val="50000"/>
+              </a:spcBef>
+              <a:spcAft>
+                <a:spcPct val="0"/>
+              </a:spcAft>
+              <a:buClr>
+                <a:srgbClr val="F0AB00"/>
+              </a:buClr>
+              <a:buSzPct val="80000"/>
+              <a:tabLst/>
+            </a:pPr>
+            <a:r>
+              <a:rPr lang="en-US" sz="1800" kern="0" dirty="0">
+                <a:ea typeface="Arial Unicode MS" pitchFamily="34" charset="-128"/>
+                <a:cs typeface="Arial Unicode MS" pitchFamily="34" charset="-128"/>
+              </a:rPr>
+              <a:t>Assign the secret to the pod like a regular volume</a:t>
+            </a:r>
+            <a:endParaRPr kumimoji="0" lang="en-US" sz="1800" b="0" i="0" u="none" strike="noStrike" kern="0" cap="none" spc="0" normalizeH="0" baseline="0" noProof="0" dirty="0">
+              <a:ln>
+                <a:noFill/>
+              </a:ln>
+              <a:effectLst/>
+              <a:uLnTx/>
+              <a:uFillTx/>
+              <a:ea typeface="Arial Unicode MS" pitchFamily="34" charset="-128"/>
+              <a:cs typeface="Arial Unicode MS" pitchFamily="34" charset="-128"/>
+            </a:endParaRPr>
+          </a:p>
+        </p:txBody>
+      </p:sp>
+      <p:sp>
+        <p:nvSpPr>
+          <p:cNvPr id="7" name="Speech Bubble: Rectangle 6">
+            <a:extLst>
+              <a:ext uri="{FF2B5EF4-FFF2-40B4-BE49-F238E27FC236}">
+                <a16:creationId xmlns:a16="http://schemas.microsoft.com/office/drawing/2014/main" id="{23B5BFDA-1E6E-483A-A490-EAB0AE41FAB4}"/>
+              </a:ext>
+            </a:extLst>
+          </p:cNvPr>
+          <p:cNvSpPr/>
+          <p:nvPr/>
+        </p:nvSpPr>
+        <p:spPr bwMode="gray">
+          <a:xfrm>
+            <a:off x="8120808" y="2457210"/>
+            <a:ext cx="2707609" cy="1127848"/>
+          </a:xfrm>
+          <a:prstGeom prst="wedgeRectCallout">
+            <a:avLst>
+              <a:gd name="adj1" fmla="val -77417"/>
+              <a:gd name="adj2" fmla="val 72466"/>
+            </a:avLst>
+          </a:prstGeom>
+          <a:ln>
+            <a:headEnd/>
+            <a:tailEnd/>
+          </a:ln>
+        </p:spPr>
+        <p:style>
+          <a:lnRef idx="2">
+            <a:schemeClr val="accent2"/>
+          </a:lnRef>
+          <a:fillRef idx="1">
+            <a:schemeClr val="lt1"/>
+          </a:fillRef>
+          <a:effectRef idx="0">
+            <a:schemeClr val="accent2"/>
+          </a:effectRef>
+          <a:fontRef idx="minor">
+            <a:schemeClr val="dk1"/>
+          </a:fontRef>
+        </p:style>
+        <p:txBody>
+          <a:bodyPr lIns="90000" tIns="72000" rIns="90000" bIns="72000" rtlCol="0" anchor="ctr"/>
+          <a:lstStyle/>
+          <a:p>
+            <a:pPr marR="0" algn="ctr" defTabSz="914400" eaLnBrk="1" fontAlgn="base" latinLnBrk="0" hangingPunct="1">
+              <a:lnSpc>
+                <a:spcPct val="100000"/>
+              </a:lnSpc>
+              <a:spcBef>
+                <a:spcPct val="50000"/>
+              </a:spcBef>
+              <a:spcAft>
+                <a:spcPct val="0"/>
+              </a:spcAft>
+              <a:buClr>
+                <a:srgbClr val="F0AB00"/>
+              </a:buClr>
+              <a:buSzPct val="80000"/>
+              <a:tabLst/>
+            </a:pPr>
+            <a:r>
+              <a:rPr lang="en-US" sz="1800" kern="0" dirty="0">
+                <a:ea typeface="Arial Unicode MS" pitchFamily="34" charset="-128"/>
+                <a:cs typeface="Arial Unicode MS" pitchFamily="34" charset="-128"/>
+              </a:rPr>
+              <a:t>Print the values of the .txt file</a:t>
+            </a:r>
+            <a:endParaRPr kumimoji="0" lang="en-US" sz="1800" b="0" i="0" u="none" strike="noStrike" kern="0" cap="none" spc="0" normalizeH="0" baseline="0" noProof="0" dirty="0">
+              <a:ln>
+                <a:noFill/>
+              </a:ln>
+              <a:effectLst/>
+              <a:uLnTx/>
+              <a:uFillTx/>
+              <a:ea typeface="Arial Unicode MS" pitchFamily="34" charset="-128"/>
+              <a:cs typeface="Arial Unicode MS" pitchFamily="34" charset="-128"/>
+            </a:endParaRPr>
+          </a:p>
+        </p:txBody>
+      </p:sp>
+      <p:sp>
+        <p:nvSpPr>
+          <p:cNvPr id="8" name="Speech Bubble: Rectangle 7">
+            <a:extLst>
+              <a:ext uri="{FF2B5EF4-FFF2-40B4-BE49-F238E27FC236}">
+                <a16:creationId xmlns:a16="http://schemas.microsoft.com/office/drawing/2014/main" id="{887616F9-C8E5-4A60-9264-C79136F79C41}"/>
+              </a:ext>
+            </a:extLst>
+          </p:cNvPr>
+          <p:cNvSpPr/>
+          <p:nvPr/>
+        </p:nvSpPr>
+        <p:spPr bwMode="gray">
+          <a:xfrm>
+            <a:off x="8120808" y="5494140"/>
+            <a:ext cx="2707609" cy="1127848"/>
+          </a:xfrm>
+          <a:prstGeom prst="wedgeRectCallout">
+            <a:avLst>
+              <a:gd name="adj1" fmla="val -164867"/>
+              <a:gd name="adj2" fmla="val -13730"/>
+            </a:avLst>
+          </a:prstGeom>
+          <a:ln>
+            <a:headEnd/>
+            <a:tailEnd/>
+          </a:ln>
+        </p:spPr>
+        <p:style>
+          <a:lnRef idx="2">
+            <a:schemeClr val="accent2"/>
+          </a:lnRef>
+          <a:fillRef idx="1">
+            <a:schemeClr val="lt1"/>
+          </a:fillRef>
+          <a:effectRef idx="0">
+            <a:schemeClr val="accent2"/>
+          </a:effectRef>
+          <a:fontRef idx="minor">
+            <a:schemeClr val="dk1"/>
+          </a:fontRef>
+        </p:style>
+        <p:txBody>
+          <a:bodyPr lIns="90000" tIns="72000" rIns="90000" bIns="72000" rtlCol="0" anchor="ctr"/>
+          <a:lstStyle/>
+          <a:p>
+            <a:pPr marR="0" algn="ctr" defTabSz="914400" eaLnBrk="1" fontAlgn="base" latinLnBrk="0" hangingPunct="1">
+              <a:lnSpc>
+                <a:spcPct val="100000"/>
+              </a:lnSpc>
+              <a:spcBef>
+                <a:spcPct val="50000"/>
+              </a:spcBef>
+              <a:spcAft>
+                <a:spcPct val="0"/>
+              </a:spcAft>
+              <a:buClr>
+                <a:srgbClr val="F0AB00"/>
+              </a:buClr>
+              <a:buSzPct val="80000"/>
+              <a:tabLst/>
+            </a:pPr>
+            <a:r>
+              <a:rPr kumimoji="0" lang="en-US" sz="1800" b="0" i="0" u="none" strike="noStrike" kern="0" cap="none" spc="0" normalizeH="0" baseline="0" noProof="0" dirty="0">
+                <a:ln>
+                  <a:noFill/>
+                </a:ln>
+                <a:effectLst/>
+                <a:uLnTx/>
+                <a:uFillTx/>
+                <a:ea typeface="Arial Unicode MS" pitchFamily="34" charset="-128"/>
+                <a:cs typeface="Arial Unicode MS" pitchFamily="34" charset="-128"/>
+              </a:rPr>
+              <a:t>The </a:t>
+            </a:r>
+            <a:r>
+              <a:rPr lang="en-US" sz="1800" kern="0" dirty="0">
+                <a:ea typeface="Arial Unicode MS" pitchFamily="34" charset="-128"/>
+                <a:cs typeface="Arial Unicode MS" pitchFamily="34" charset="-128"/>
+              </a:rPr>
+              <a:t>secret’s content is no longer decoded</a:t>
+            </a:r>
+            <a:endParaRPr kumimoji="0" lang="en-US" sz="1800" b="0" i="0" u="none" strike="noStrike" kern="0" cap="none" spc="0" normalizeH="0" baseline="0" noProof="0" dirty="0">
+              <a:ln>
+                <a:noFill/>
+              </a:ln>
+              <a:effectLst/>
+              <a:uLnTx/>
+              <a:uFillTx/>
+              <a:ea typeface="Arial Unicode MS" pitchFamily="34" charset="-128"/>
+              <a:cs typeface="Arial Unicode MS" pitchFamily="34" charset="-128"/>
+            </a:endParaRPr>
+          </a:p>
+        </p:txBody>
+      </p:sp>
+    </p:spTree>
+    <p:extLst>
+      <p:ext uri="{BB962C8B-B14F-4D97-AF65-F5344CB8AC3E}">
+        <p14:creationId xmlns:p14="http://schemas.microsoft.com/office/powerpoint/2010/main" val="2724776292"/>
+      </p:ext>
+    </p:extLst>
+  </p:cSld>
+  <p:clrMapOvr>
+    <a:masterClrMapping/>
+  </p:clrMapOvr>
+</p:sld>
+</file>
+
+<file path=ppt/slides/slide8.xml><?xml version="1.0" encoding="utf-8"?>
 <p:sld xmlns:a="http://schemas.openxmlformats.org/drawingml/2006/main" xmlns:r="http://schemas.openxmlformats.org/officeDocument/2006/relationships" xmlns:p="http://schemas.openxmlformats.org/presentationml/2006/main">
   <p:cSld>
     <p:spTree>
@@ -17236,7 +19237,7 @@
 </p:sld>
 </file>
 
-<file path=ppt/slides/slide7.xml><?xml version="1.0" encoding="utf-8"?>
+<file path=ppt/slides/slide9.xml><?xml version="1.0" encoding="utf-8"?>
 <p:sld xmlns:a="http://schemas.openxmlformats.org/drawingml/2006/main" xmlns:r="http://schemas.openxmlformats.org/officeDocument/2006/relationships" xmlns:p="http://schemas.openxmlformats.org/presentationml/2006/main" show="0">
   <p:cSld>
     <p:spTree>

</xml_diff>